<commit_message>
Finalize final overview pic, with Freds edits
</commit_message>
<xml_diff>
--- a/Figures/Overarching Picture.pptx
+++ b/Figures/Overarching Picture.pptx
@@ -112,7 +112,18 @@
   </p:defaultTextStyle>
   <p:extLst>
     <p:ext uri="{EFAFB233-063F-42B5-8137-9DF3F51BA10A}">
-      <p15:sldGuideLst xmlns:p15="http://schemas.microsoft.com/office/powerpoint/2012/main"/>
+      <p15:sldGuideLst xmlns:p15="http://schemas.microsoft.com/office/powerpoint/2012/main">
+        <p15:guide id="1" orient="horz" pos="4032">
+          <p15:clr>
+            <a:srgbClr val="A4A3A4"/>
+          </p15:clr>
+        </p15:guide>
+        <p15:guide id="2" pos="4032">
+          <p15:clr>
+            <a:srgbClr val="A4A3A4"/>
+          </p15:clr>
+        </p15:guide>
+      </p15:sldGuideLst>
     </p:ext>
   </p:extLst>
 </p:presentation>
@@ -200,7 +211,7 @@
           <a:p>
             <a:fld id="{FA0208F8-9E48-EB42-8B3D-B29CB3347377}" type="datetimeFigureOut">
               <a:rPr lang="en-US" smtClean="0"/>
-              <a:t>8/12/19</a:t>
+              <a:t>8/15/19</a:t>
             </a:fld>
             <a:endParaRPr lang="en-US"/>
           </a:p>
@@ -954,7 +965,7 @@
           <a:p>
             <a:fld id="{219C0BBA-6252-1947-997E-F20D5F49F668}" type="datetimeFigureOut">
               <a:rPr lang="en-US" smtClean="0"/>
-              <a:t>8/12/19</a:t>
+              <a:t>8/15/19</a:t>
             </a:fld>
             <a:endParaRPr lang="en-US"/>
           </a:p>
@@ -1124,7 +1135,7 @@
           <a:p>
             <a:fld id="{219C0BBA-6252-1947-997E-F20D5F49F668}" type="datetimeFigureOut">
               <a:rPr lang="en-US" smtClean="0"/>
-              <a:t>8/12/19</a:t>
+              <a:t>8/15/19</a:t>
             </a:fld>
             <a:endParaRPr lang="en-US"/>
           </a:p>
@@ -1304,7 +1315,7 @@
           <a:p>
             <a:fld id="{219C0BBA-6252-1947-997E-F20D5F49F668}" type="datetimeFigureOut">
               <a:rPr lang="en-US" smtClean="0"/>
-              <a:t>8/12/19</a:t>
+              <a:t>8/15/19</a:t>
             </a:fld>
             <a:endParaRPr lang="en-US"/>
           </a:p>
@@ -1474,7 +1485,7 @@
           <a:p>
             <a:fld id="{219C0BBA-6252-1947-997E-F20D5F49F668}" type="datetimeFigureOut">
               <a:rPr lang="en-US" smtClean="0"/>
-              <a:t>8/12/19</a:t>
+              <a:t>8/15/19</a:t>
             </a:fld>
             <a:endParaRPr lang="en-US"/>
           </a:p>
@@ -1718,7 +1729,7 @@
           <a:p>
             <a:fld id="{219C0BBA-6252-1947-997E-F20D5F49F668}" type="datetimeFigureOut">
               <a:rPr lang="en-US" smtClean="0"/>
-              <a:t>8/12/19</a:t>
+              <a:t>8/15/19</a:t>
             </a:fld>
             <a:endParaRPr lang="en-US"/>
           </a:p>
@@ -1950,7 +1961,7 @@
           <a:p>
             <a:fld id="{219C0BBA-6252-1947-997E-F20D5F49F668}" type="datetimeFigureOut">
               <a:rPr lang="en-US" smtClean="0"/>
-              <a:t>8/12/19</a:t>
+              <a:t>8/15/19</a:t>
             </a:fld>
             <a:endParaRPr lang="en-US"/>
           </a:p>
@@ -2317,7 +2328,7 @@
           <a:p>
             <a:fld id="{219C0BBA-6252-1947-997E-F20D5F49F668}" type="datetimeFigureOut">
               <a:rPr lang="en-US" smtClean="0"/>
-              <a:t>8/12/19</a:t>
+              <a:t>8/15/19</a:t>
             </a:fld>
             <a:endParaRPr lang="en-US"/>
           </a:p>
@@ -2435,7 +2446,7 @@
           <a:p>
             <a:fld id="{219C0BBA-6252-1947-997E-F20D5F49F668}" type="datetimeFigureOut">
               <a:rPr lang="en-US" smtClean="0"/>
-              <a:t>8/12/19</a:t>
+              <a:t>8/15/19</a:t>
             </a:fld>
             <a:endParaRPr lang="en-US"/>
           </a:p>
@@ -2530,7 +2541,7 @@
           <a:p>
             <a:fld id="{219C0BBA-6252-1947-997E-F20D5F49F668}" type="datetimeFigureOut">
               <a:rPr lang="en-US" smtClean="0"/>
-              <a:t>8/12/19</a:t>
+              <a:t>8/15/19</a:t>
             </a:fld>
             <a:endParaRPr lang="en-US"/>
           </a:p>
@@ -2807,7 +2818,7 @@
           <a:p>
             <a:fld id="{219C0BBA-6252-1947-997E-F20D5F49F668}" type="datetimeFigureOut">
               <a:rPr lang="en-US" smtClean="0"/>
-              <a:t>8/12/19</a:t>
+              <a:t>8/15/19</a:t>
             </a:fld>
             <a:endParaRPr lang="en-US"/>
           </a:p>
@@ -3064,7 +3075,7 @@
           <a:p>
             <a:fld id="{219C0BBA-6252-1947-997E-F20D5F49F668}" type="datetimeFigureOut">
               <a:rPr lang="en-US" smtClean="0"/>
-              <a:t>8/12/19</a:t>
+              <a:t>8/15/19</a:t>
             </a:fld>
             <a:endParaRPr lang="en-US"/>
           </a:p>
@@ -3277,7 +3288,7 @@
           <a:p>
             <a:fld id="{219C0BBA-6252-1947-997E-F20D5F49F668}" type="datetimeFigureOut">
               <a:rPr lang="en-US" smtClean="0"/>
-              <a:t>8/12/19</a:t>
+              <a:t>8/15/19</a:t>
             </a:fld>
             <a:endParaRPr lang="en-US"/>
           </a:p>
@@ -3682,691 +3693,26 @@
           <a:chExt cx="0" cy="0"/>
         </a:xfrm>
       </p:grpSpPr>
-      <p:pic>
-        <p:nvPicPr>
-          <p:cNvPr id="23" name="Picture 22">
-            <a:extLst>
-              <a:ext uri="{FF2B5EF4-FFF2-40B4-BE49-F238E27FC236}">
-                <a16:creationId xmlns:a16="http://schemas.microsoft.com/office/drawing/2014/main" id="{2AFA001A-148E-1D47-B207-3EB7743CA8DB}"/>
-              </a:ext>
-            </a:extLst>
-          </p:cNvPr>
-          <p:cNvPicPr>
-            <a:picLocks noChangeAspect="1"/>
-          </p:cNvPicPr>
-          <p:nvPr/>
-        </p:nvPicPr>
-        <p:blipFill>
-          <a:blip r:embed="rId3"/>
-          <a:stretch>
-            <a:fillRect/>
-          </a:stretch>
-        </p:blipFill>
-        <p:spPr>
-          <a:xfrm>
-            <a:off x="6235412" y="3103604"/>
-            <a:ext cx="2975166" cy="3348033"/>
-          </a:xfrm>
-          <a:prstGeom prst="rect">
-            <a:avLst/>
-          </a:prstGeom>
-        </p:spPr>
-      </p:pic>
-      <p:pic>
-        <p:nvPicPr>
-          <p:cNvPr id="5" name="Picture 4">
-            <a:extLst>
-              <a:ext uri="{FF2B5EF4-FFF2-40B4-BE49-F238E27FC236}">
-                <a16:creationId xmlns:a16="http://schemas.microsoft.com/office/drawing/2014/main" id="{1BFDE913-F0EE-B944-965A-781A8F7B6BC1}"/>
-              </a:ext>
-            </a:extLst>
-          </p:cNvPr>
-          <p:cNvPicPr>
-            <a:picLocks noChangeAspect="1"/>
-          </p:cNvPicPr>
-          <p:nvPr/>
-        </p:nvPicPr>
-        <p:blipFill>
-          <a:blip r:embed="rId4"/>
-          <a:stretch>
-            <a:fillRect/>
-          </a:stretch>
-        </p:blipFill>
-        <p:spPr>
-          <a:xfrm>
-            <a:off x="3431373" y="671875"/>
-            <a:ext cx="4893945" cy="773430"/>
-          </a:xfrm>
-          <a:prstGeom prst="rect">
-            <a:avLst/>
-          </a:prstGeom>
-        </p:spPr>
-      </p:pic>
-      <p:pic>
-        <p:nvPicPr>
-          <p:cNvPr id="8" name="Picture 7">
-            <a:extLst>
-              <a:ext uri="{FF2B5EF4-FFF2-40B4-BE49-F238E27FC236}">
-                <a16:creationId xmlns:a16="http://schemas.microsoft.com/office/drawing/2014/main" id="{79AE17A0-3889-CF49-ABF8-A27CD8F99411}"/>
-              </a:ext>
-            </a:extLst>
-          </p:cNvPr>
-          <p:cNvPicPr>
-            <a:picLocks noChangeAspect="1"/>
-          </p:cNvPicPr>
-          <p:nvPr/>
-        </p:nvPicPr>
-        <p:blipFill>
-          <a:blip r:embed="rId5"/>
-          <a:stretch>
-            <a:fillRect/>
-          </a:stretch>
-        </p:blipFill>
-        <p:spPr>
-          <a:xfrm>
-            <a:off x="3870994" y="2031340"/>
-            <a:ext cx="4028227" cy="569205"/>
-          </a:xfrm>
-          <a:prstGeom prst="rect">
-            <a:avLst/>
-          </a:prstGeom>
-        </p:spPr>
-      </p:pic>
-      <p:sp>
-        <p:nvSpPr>
-          <p:cNvPr id="10" name="TextBox 9">
-            <a:extLst>
-              <a:ext uri="{FF2B5EF4-FFF2-40B4-BE49-F238E27FC236}">
-                <a16:creationId xmlns:a16="http://schemas.microsoft.com/office/drawing/2014/main" id="{7A22E701-43A2-A243-A574-FE42918540D2}"/>
-              </a:ext>
-            </a:extLst>
-          </p:cNvPr>
-          <p:cNvSpPr txBox="1"/>
-          <p:nvPr/>
-        </p:nvSpPr>
-        <p:spPr>
-          <a:xfrm>
-            <a:off x="5935401" y="1603535"/>
-            <a:ext cx="3349378" cy="369332"/>
-          </a:xfrm>
-          <a:prstGeom prst="rect">
-            <a:avLst/>
-          </a:prstGeom>
-          <a:noFill/>
-        </p:spPr>
-        <p:txBody>
-          <a:bodyPr wrap="none" rtlCol="0">
-            <a:spAutoFit/>
-          </a:bodyPr>
-          <a:lstStyle/>
-          <a:p>
-            <a:r>
-              <a:rPr lang="en-US" sz="1800" dirty="0">
-                <a:latin typeface="Times New Roman" panose="02020603050405020304" pitchFamily="18" charset="0"/>
-                <a:cs typeface="Times New Roman" panose="02020603050405020304" pitchFamily="18" charset="0"/>
-              </a:rPr>
-              <a:t>Jordan-Wigner gives Pauli strings</a:t>
-            </a:r>
-          </a:p>
-        </p:txBody>
-      </p:sp>
-      <p:sp>
-        <p:nvSpPr>
-          <p:cNvPr id="11" name="TextBox 10">
-            <a:extLst>
-              <a:ext uri="{FF2B5EF4-FFF2-40B4-BE49-F238E27FC236}">
-                <a16:creationId xmlns:a16="http://schemas.microsoft.com/office/drawing/2014/main" id="{C93C68D2-713C-564F-9D74-AADC5D178A82}"/>
-              </a:ext>
-            </a:extLst>
-          </p:cNvPr>
-          <p:cNvSpPr txBox="1"/>
-          <p:nvPr/>
-        </p:nvSpPr>
-        <p:spPr>
-          <a:xfrm>
-            <a:off x="6206280" y="2811985"/>
-            <a:ext cx="3004297" cy="400110"/>
-          </a:xfrm>
-          <a:prstGeom prst="rect">
-            <a:avLst/>
-          </a:prstGeom>
-          <a:noFill/>
-        </p:spPr>
-        <p:txBody>
-          <a:bodyPr wrap="square" rtlCol="0">
-            <a:spAutoFit/>
-          </a:bodyPr>
-          <a:lstStyle/>
-          <a:p>
-            <a:pPr algn="ctr"/>
-            <a:r>
-              <a:rPr lang="en-US" sz="2000" dirty="0">
-                <a:latin typeface="Times New Roman" panose="02020603050405020304" pitchFamily="18" charset="0"/>
-                <a:cs typeface="Times New Roman" panose="02020603050405020304" pitchFamily="18" charset="0"/>
-              </a:rPr>
-              <a:t>*GC Clique Transpilation*</a:t>
-            </a:r>
-          </a:p>
-        </p:txBody>
-      </p:sp>
-      <p:sp>
-        <p:nvSpPr>
-          <p:cNvPr id="13" name="TextBox 12">
-            <a:extLst>
-              <a:ext uri="{FF2B5EF4-FFF2-40B4-BE49-F238E27FC236}">
-                <a16:creationId xmlns:a16="http://schemas.microsoft.com/office/drawing/2014/main" id="{DA49E5BB-011A-2E4B-8EC9-EE4CFB681926}"/>
-              </a:ext>
-            </a:extLst>
-          </p:cNvPr>
-          <p:cNvSpPr txBox="1"/>
-          <p:nvPr/>
-        </p:nvSpPr>
-        <p:spPr>
-          <a:xfrm>
-            <a:off x="5632215" y="3850390"/>
-            <a:ext cx="542136" cy="400110"/>
-          </a:xfrm>
-          <a:prstGeom prst="rect">
-            <a:avLst/>
-          </a:prstGeom>
-          <a:noFill/>
-        </p:spPr>
-        <p:txBody>
-          <a:bodyPr wrap="none" rtlCol="0">
-            <a:spAutoFit/>
-          </a:bodyPr>
-          <a:lstStyle/>
-          <a:p>
-            <a:r>
-              <a:rPr lang="en-US" sz="2000" dirty="0">
-                <a:latin typeface="Times New Roman" panose="02020603050405020304" pitchFamily="18" charset="0"/>
-                <a:cs typeface="Times New Roman" panose="02020603050405020304" pitchFamily="18" charset="0"/>
-              </a:rPr>
-              <a:t>OR</a:t>
-            </a:r>
-          </a:p>
-        </p:txBody>
-      </p:sp>
-      <p:sp>
-        <p:nvSpPr>
-          <p:cNvPr id="14" name="TextBox 13">
-            <a:extLst>
-              <a:ext uri="{FF2B5EF4-FFF2-40B4-BE49-F238E27FC236}">
-                <a16:creationId xmlns:a16="http://schemas.microsoft.com/office/drawing/2014/main" id="{88CBEAEB-1A46-2544-A1FA-54F0E27321DC}"/>
-              </a:ext>
-            </a:extLst>
-          </p:cNvPr>
-          <p:cNvSpPr txBox="1"/>
-          <p:nvPr/>
-        </p:nvSpPr>
-        <p:spPr>
-          <a:xfrm>
-            <a:off x="2965736" y="2788558"/>
-            <a:ext cx="2510624" cy="400110"/>
-          </a:xfrm>
-          <a:prstGeom prst="rect">
-            <a:avLst/>
-          </a:prstGeom>
-          <a:noFill/>
-        </p:spPr>
-        <p:txBody>
-          <a:bodyPr wrap="none" rtlCol="0">
-            <a:spAutoFit/>
-          </a:bodyPr>
-          <a:lstStyle/>
-          <a:p>
-            <a:r>
-              <a:rPr lang="en-US" sz="2000" dirty="0">
-                <a:latin typeface="Times New Roman" panose="02020603050405020304" pitchFamily="18" charset="0"/>
-                <a:cs typeface="Times New Roman" panose="02020603050405020304" pitchFamily="18" charset="0"/>
-              </a:rPr>
-              <a:t>*Naïve Measurement*</a:t>
-            </a:r>
-          </a:p>
-        </p:txBody>
-      </p:sp>
-      <p:sp>
-        <p:nvSpPr>
-          <p:cNvPr id="205" name="TextBox 204">
-            <a:extLst>
-              <a:ext uri="{FF2B5EF4-FFF2-40B4-BE49-F238E27FC236}">
-                <a16:creationId xmlns:a16="http://schemas.microsoft.com/office/drawing/2014/main" id="{3C11B41D-2160-9141-83C0-1D6F5D0FBA24}"/>
-              </a:ext>
-            </a:extLst>
-          </p:cNvPr>
-          <p:cNvSpPr txBox="1"/>
-          <p:nvPr/>
-        </p:nvSpPr>
-        <p:spPr>
-          <a:xfrm>
-            <a:off x="2856945" y="6393726"/>
-            <a:ext cx="2975432" cy="397480"/>
-          </a:xfrm>
-          <a:prstGeom prst="rect">
-            <a:avLst/>
-          </a:prstGeom>
-          <a:noFill/>
-        </p:spPr>
-        <p:txBody>
-          <a:bodyPr wrap="square" rtlCol="0">
-            <a:spAutoFit/>
-          </a:bodyPr>
-          <a:lstStyle/>
-          <a:p>
-            <a:pPr algn="ctr"/>
-            <a:r>
-              <a:rPr lang="en-US" sz="2000" dirty="0">
-                <a:latin typeface="Times New Roman" panose="02020603050405020304" pitchFamily="18" charset="0"/>
-                <a:cs typeface="Times New Roman" panose="02020603050405020304" pitchFamily="18" charset="0"/>
-              </a:rPr>
-              <a:t>*Circuit Synthesis*</a:t>
-            </a:r>
-          </a:p>
-        </p:txBody>
-      </p:sp>
-      <p:pic>
-        <p:nvPicPr>
-          <p:cNvPr id="7" name="Picture 6">
-            <a:extLst>
-              <a:ext uri="{FF2B5EF4-FFF2-40B4-BE49-F238E27FC236}">
-                <a16:creationId xmlns:a16="http://schemas.microsoft.com/office/drawing/2014/main" id="{34331E85-1E32-BE4D-8A00-AEF63BB7712A}"/>
-              </a:ext>
-            </a:extLst>
-          </p:cNvPr>
-          <p:cNvPicPr>
-            <a:picLocks noChangeAspect="1"/>
-          </p:cNvPicPr>
-          <p:nvPr/>
-        </p:nvPicPr>
-        <p:blipFill>
-          <a:blip r:embed="rId6"/>
-          <a:stretch>
-            <a:fillRect/>
-          </a:stretch>
-        </p:blipFill>
-        <p:spPr>
-          <a:xfrm>
-            <a:off x="2875629" y="3170550"/>
-            <a:ext cx="2665438" cy="2091966"/>
-          </a:xfrm>
-          <a:prstGeom prst="rect">
-            <a:avLst/>
-          </a:prstGeom>
-        </p:spPr>
-      </p:pic>
-      <p:sp>
-        <p:nvSpPr>
-          <p:cNvPr id="12" name="TextBox 11">
-            <a:extLst>
-              <a:ext uri="{FF2B5EF4-FFF2-40B4-BE49-F238E27FC236}">
-                <a16:creationId xmlns:a16="http://schemas.microsoft.com/office/drawing/2014/main" id="{C0F716CB-5854-BF45-9A50-F20C902B8354}"/>
-              </a:ext>
-            </a:extLst>
-          </p:cNvPr>
-          <p:cNvSpPr txBox="1"/>
-          <p:nvPr/>
-        </p:nvSpPr>
-        <p:spPr>
-          <a:xfrm>
-            <a:off x="4506774" y="196244"/>
-            <a:ext cx="3060453" cy="461665"/>
-          </a:xfrm>
-          <a:prstGeom prst="rect">
-            <a:avLst/>
-          </a:prstGeom>
-          <a:noFill/>
-        </p:spPr>
-        <p:txBody>
-          <a:bodyPr wrap="none" rtlCol="0">
-            <a:spAutoFit/>
-          </a:bodyPr>
-          <a:lstStyle/>
-          <a:p>
-            <a:r>
-              <a:rPr lang="en-US" sz="2400" dirty="0">
-                <a:latin typeface="Times New Roman" panose="02020603050405020304" pitchFamily="18" charset="0"/>
-                <a:cs typeface="Times New Roman" panose="02020603050405020304" pitchFamily="18" charset="0"/>
-              </a:rPr>
-              <a:t>Molecular Hamiltonian</a:t>
-            </a:r>
-          </a:p>
-        </p:txBody>
-      </p:sp>
-      <p:sp>
-        <p:nvSpPr>
-          <p:cNvPr id="16" name="Rectangle 15">
-            <a:extLst>
-              <a:ext uri="{FF2B5EF4-FFF2-40B4-BE49-F238E27FC236}">
-                <a16:creationId xmlns:a16="http://schemas.microsoft.com/office/drawing/2014/main" id="{1D9BC04A-15B4-724E-9CA6-82E82C3473C0}"/>
-              </a:ext>
-            </a:extLst>
-          </p:cNvPr>
-          <p:cNvSpPr/>
-          <p:nvPr/>
-        </p:nvSpPr>
-        <p:spPr>
-          <a:xfrm>
-            <a:off x="3408893" y="615778"/>
-            <a:ext cx="4940550" cy="878833"/>
-          </a:xfrm>
-          <a:prstGeom prst="rect">
-            <a:avLst/>
-          </a:prstGeom>
-          <a:noFill/>
-          <a:ln>
-            <a:solidFill>
-              <a:schemeClr val="tx1"/>
-            </a:solidFill>
-          </a:ln>
-        </p:spPr>
-        <p:style>
-          <a:lnRef idx="2">
-            <a:schemeClr val="accent1">
-              <a:shade val="50000"/>
-            </a:schemeClr>
-          </a:lnRef>
-          <a:fillRef idx="1">
-            <a:schemeClr val="accent1"/>
-          </a:fillRef>
-          <a:effectRef idx="0">
-            <a:schemeClr val="accent1"/>
-          </a:effectRef>
-          <a:fontRef idx="minor">
-            <a:schemeClr val="lt1"/>
-          </a:fontRef>
-        </p:style>
-        <p:txBody>
-          <a:bodyPr rot="0" spcFirstLastPara="0" vertOverflow="overflow" horzOverflow="overflow" vert="horz" wrap="square" lIns="96012" tIns="48006" rIns="96012" bIns="48006" numCol="1" spcCol="0" rtlCol="0" fromWordArt="0" anchor="ctr" anchorCtr="0" forceAA="0" compatLnSpc="1">
-            <a:prstTxWarp prst="textNoShape">
-              <a:avLst/>
-            </a:prstTxWarp>
-            <a:noAutofit/>
-          </a:bodyPr>
-          <a:lstStyle/>
-          <a:p>
-            <a:pPr algn="ctr"/>
-            <a:endParaRPr lang="en-US" sz="2722"/>
-          </a:p>
-        </p:txBody>
-      </p:sp>
-      <p:sp>
-        <p:nvSpPr>
-          <p:cNvPr id="59" name="Rectangle 58">
-            <a:extLst>
-              <a:ext uri="{FF2B5EF4-FFF2-40B4-BE49-F238E27FC236}">
-                <a16:creationId xmlns:a16="http://schemas.microsoft.com/office/drawing/2014/main" id="{20F504D3-1CFD-5E46-833D-735984981B15}"/>
-              </a:ext>
-            </a:extLst>
-          </p:cNvPr>
-          <p:cNvSpPr/>
-          <p:nvPr/>
-        </p:nvSpPr>
-        <p:spPr>
-          <a:xfrm>
-            <a:off x="3870994" y="2073133"/>
-            <a:ext cx="3975190" cy="476089"/>
-          </a:xfrm>
-          <a:prstGeom prst="rect">
-            <a:avLst/>
-          </a:prstGeom>
-          <a:noFill/>
-          <a:ln>
-            <a:solidFill>
-              <a:schemeClr val="tx1"/>
-            </a:solidFill>
-          </a:ln>
-        </p:spPr>
-        <p:style>
-          <a:lnRef idx="2">
-            <a:schemeClr val="accent1">
-              <a:shade val="50000"/>
-            </a:schemeClr>
-          </a:lnRef>
-          <a:fillRef idx="1">
-            <a:schemeClr val="accent1"/>
-          </a:fillRef>
-          <a:effectRef idx="0">
-            <a:schemeClr val="accent1"/>
-          </a:effectRef>
-          <a:fontRef idx="minor">
-            <a:schemeClr val="lt1"/>
-          </a:fontRef>
-        </p:style>
-        <p:txBody>
-          <a:bodyPr rot="0" spcFirstLastPara="0" vertOverflow="overflow" horzOverflow="overflow" vert="horz" wrap="square" lIns="96012" tIns="48006" rIns="96012" bIns="48006" numCol="1" spcCol="0" rtlCol="0" fromWordArt="0" anchor="ctr" anchorCtr="0" forceAA="0" compatLnSpc="1">
-            <a:prstTxWarp prst="textNoShape">
-              <a:avLst/>
-            </a:prstTxWarp>
-            <a:noAutofit/>
-          </a:bodyPr>
-          <a:lstStyle/>
-          <a:p>
-            <a:pPr algn="ctr"/>
-            <a:endParaRPr lang="en-US" sz="2722"/>
-          </a:p>
-        </p:txBody>
-      </p:sp>
-      <p:sp>
-        <p:nvSpPr>
-          <p:cNvPr id="60" name="Rectangle 59">
-            <a:extLst>
-              <a:ext uri="{FF2B5EF4-FFF2-40B4-BE49-F238E27FC236}">
-                <a16:creationId xmlns:a16="http://schemas.microsoft.com/office/drawing/2014/main" id="{EF715F70-D1E6-A843-8A03-47A41EAC80F7}"/>
-              </a:ext>
-            </a:extLst>
-          </p:cNvPr>
-          <p:cNvSpPr/>
-          <p:nvPr/>
-        </p:nvSpPr>
-        <p:spPr>
-          <a:xfrm>
-            <a:off x="2819714" y="2775672"/>
-            <a:ext cx="2759453" cy="2875358"/>
-          </a:xfrm>
-          <a:prstGeom prst="rect">
-            <a:avLst/>
-          </a:prstGeom>
-          <a:noFill/>
-          <a:ln>
-            <a:solidFill>
-              <a:schemeClr val="tx1"/>
-            </a:solidFill>
-          </a:ln>
-        </p:spPr>
-        <p:style>
-          <a:lnRef idx="2">
-            <a:schemeClr val="accent1">
-              <a:shade val="50000"/>
-            </a:schemeClr>
-          </a:lnRef>
-          <a:fillRef idx="1">
-            <a:schemeClr val="accent1"/>
-          </a:fillRef>
-          <a:effectRef idx="0">
-            <a:schemeClr val="accent1"/>
-          </a:effectRef>
-          <a:fontRef idx="minor">
-            <a:schemeClr val="lt1"/>
-          </a:fontRef>
-        </p:style>
-        <p:txBody>
-          <a:bodyPr rot="0" spcFirstLastPara="0" vertOverflow="overflow" horzOverflow="overflow" vert="horz" wrap="square" lIns="96012" tIns="48006" rIns="96012" bIns="48006" numCol="1" spcCol="0" rtlCol="0" fromWordArt="0" anchor="ctr" anchorCtr="0" forceAA="0" compatLnSpc="1">
-            <a:prstTxWarp prst="textNoShape">
-              <a:avLst/>
-            </a:prstTxWarp>
-            <a:noAutofit/>
-          </a:bodyPr>
-          <a:lstStyle/>
-          <a:p>
-            <a:pPr algn="ctr"/>
-            <a:endParaRPr lang="en-US" sz="2722"/>
-          </a:p>
-        </p:txBody>
-      </p:sp>
-      <p:sp>
-        <p:nvSpPr>
-          <p:cNvPr id="66" name="Down Arrow 65">
-            <a:extLst>
-              <a:ext uri="{FF2B5EF4-FFF2-40B4-BE49-F238E27FC236}">
-                <a16:creationId xmlns:a16="http://schemas.microsoft.com/office/drawing/2014/main" id="{3F51AC6A-8D17-2D45-9F67-8972D740FC97}"/>
-              </a:ext>
-            </a:extLst>
-          </p:cNvPr>
-          <p:cNvSpPr/>
-          <p:nvPr/>
-        </p:nvSpPr>
-        <p:spPr>
-          <a:xfrm>
-            <a:off x="5729773" y="1595914"/>
-            <a:ext cx="202095" cy="402607"/>
-          </a:xfrm>
-          <a:prstGeom prst="downArrow">
-            <a:avLst/>
-          </a:prstGeom>
-        </p:spPr>
-        <p:style>
-          <a:lnRef idx="2">
-            <a:schemeClr val="accent1">
-              <a:shade val="50000"/>
-            </a:schemeClr>
-          </a:lnRef>
-          <a:fillRef idx="1">
-            <a:schemeClr val="accent1"/>
-          </a:fillRef>
-          <a:effectRef idx="0">
-            <a:schemeClr val="accent1"/>
-          </a:effectRef>
-          <a:fontRef idx="minor">
-            <a:schemeClr val="lt1"/>
-          </a:fontRef>
-        </p:style>
-        <p:txBody>
-          <a:bodyPr rtlCol="0" anchor="ctr"/>
-          <a:lstStyle/>
-          <a:p>
-            <a:pPr algn="ctr"/>
-            <a:endParaRPr lang="en-US" sz="2722"/>
-          </a:p>
-        </p:txBody>
-      </p:sp>
-      <p:sp>
-        <p:nvSpPr>
-          <p:cNvPr id="17" name="Bent-Up Arrow 16">
-            <a:extLst>
-              <a:ext uri="{FF2B5EF4-FFF2-40B4-BE49-F238E27FC236}">
-                <a16:creationId xmlns:a16="http://schemas.microsoft.com/office/drawing/2014/main" id="{CC646EC8-3955-284C-85E6-7D4755429239}"/>
-              </a:ext>
-            </a:extLst>
-          </p:cNvPr>
-          <p:cNvSpPr/>
-          <p:nvPr/>
-        </p:nvSpPr>
-        <p:spPr>
-          <a:xfrm rot="10800000">
-            <a:off x="3288039" y="2264667"/>
-            <a:ext cx="412818" cy="420362"/>
-          </a:xfrm>
-          <a:prstGeom prst="bentUpArrow">
-            <a:avLst/>
-          </a:prstGeom>
-        </p:spPr>
-        <p:style>
-          <a:lnRef idx="2">
-            <a:schemeClr val="accent1">
-              <a:shade val="50000"/>
-            </a:schemeClr>
-          </a:lnRef>
-          <a:fillRef idx="1">
-            <a:schemeClr val="accent1"/>
-          </a:fillRef>
-          <a:effectRef idx="0">
-            <a:schemeClr val="accent1"/>
-          </a:effectRef>
-          <a:fontRef idx="minor">
-            <a:schemeClr val="lt1"/>
-          </a:fontRef>
-        </p:style>
-        <p:txBody>
-          <a:bodyPr rtlCol="0" anchor="ctr"/>
-          <a:lstStyle/>
-          <a:p>
-            <a:pPr algn="ctr"/>
-            <a:endParaRPr lang="en-US"/>
-          </a:p>
-        </p:txBody>
-      </p:sp>
-      <p:sp>
-        <p:nvSpPr>
-          <p:cNvPr id="68" name="Bent-Up Arrow 67">
-            <a:extLst>
-              <a:ext uri="{FF2B5EF4-FFF2-40B4-BE49-F238E27FC236}">
-                <a16:creationId xmlns:a16="http://schemas.microsoft.com/office/drawing/2014/main" id="{91212669-14A7-5446-AC28-FFA6F47CCF07}"/>
-              </a:ext>
-            </a:extLst>
-          </p:cNvPr>
-          <p:cNvSpPr/>
-          <p:nvPr/>
-        </p:nvSpPr>
-        <p:spPr>
-          <a:xfrm rot="10800000" flipH="1">
-            <a:off x="8010719" y="2264667"/>
-            <a:ext cx="410871" cy="420362"/>
-          </a:xfrm>
-          <a:prstGeom prst="bentUpArrow">
-            <a:avLst/>
-          </a:prstGeom>
-        </p:spPr>
-        <p:style>
-          <a:lnRef idx="2">
-            <a:schemeClr val="accent1">
-              <a:shade val="50000"/>
-            </a:schemeClr>
-          </a:lnRef>
-          <a:fillRef idx="1">
-            <a:schemeClr val="accent1"/>
-          </a:fillRef>
-          <a:effectRef idx="0">
-            <a:schemeClr val="accent1"/>
-          </a:effectRef>
-          <a:fontRef idx="minor">
-            <a:schemeClr val="lt1"/>
-          </a:fontRef>
-        </p:style>
-        <p:txBody>
-          <a:bodyPr rtlCol="0" anchor="ctr"/>
-          <a:lstStyle/>
-          <a:p>
-            <a:pPr algn="ctr"/>
-            <a:endParaRPr lang="en-US"/>
-          </a:p>
-        </p:txBody>
-      </p:sp>
       <p:grpSp>
         <p:nvGrpSpPr>
-          <p:cNvPr id="53" name="Group 52">
-            <a:extLst>
-              <a:ext uri="{FF2B5EF4-FFF2-40B4-BE49-F238E27FC236}">
-                <a16:creationId xmlns:a16="http://schemas.microsoft.com/office/drawing/2014/main" id="{10247265-4A13-A84E-953B-688114695264}"/>
-              </a:ext>
-            </a:extLst>
-          </p:cNvPr>
+          <p:cNvPr id="55" name="Group 54"/>
           <p:cNvGrpSpPr/>
           <p:nvPr/>
         </p:nvGrpSpPr>
         <p:grpSpPr>
           <a:xfrm>
-            <a:off x="2856945" y="6772156"/>
-            <a:ext cx="2964672" cy="1284655"/>
-            <a:chOff x="9735257" y="7099825"/>
-            <a:chExt cx="3453634" cy="1477854"/>
+            <a:off x="2819714" y="252205"/>
+            <a:ext cx="6639501" cy="9268916"/>
+            <a:chOff x="2819714" y="252205"/>
+            <a:chExt cx="6639501" cy="9268916"/>
           </a:xfrm>
         </p:grpSpPr>
         <p:pic>
           <p:nvPicPr>
-            <p:cNvPr id="19" name="Picture 18">
+            <p:cNvPr id="23" name="Picture 22">
               <a:extLst>
                 <a:ext uri="{FF2B5EF4-FFF2-40B4-BE49-F238E27FC236}">
-                  <a16:creationId xmlns:a16="http://schemas.microsoft.com/office/drawing/2014/main" id="{1C11714E-9E88-674E-9C74-8D4552581083}"/>
+                  <a16:creationId xmlns:a16="http://schemas.microsoft.com/office/drawing/2014/main" id="{2AFA001A-148E-1D47-B207-3EB7743CA8DB}"/>
                 </a:ext>
               </a:extLst>
             </p:cNvPr>
@@ -4376,15 +3722,15 @@
             <p:nvPr/>
           </p:nvPicPr>
           <p:blipFill>
-            <a:blip r:embed="rId7"/>
+            <a:blip r:embed="rId3"/>
             <a:stretch>
               <a:fillRect/>
             </a:stretch>
           </p:blipFill>
           <p:spPr>
             <a:xfrm>
-              <a:off x="9735257" y="7099825"/>
-              <a:ext cx="570757" cy="1477854"/>
+              <a:off x="6385810" y="3373669"/>
+              <a:ext cx="2638269" cy="2968914"/>
             </a:xfrm>
             <a:prstGeom prst="rect">
               <a:avLst/>
@@ -4393,10 +3739,10 @@
         </p:pic>
         <p:pic>
           <p:nvPicPr>
-            <p:cNvPr id="21" name="Picture 20">
+            <p:cNvPr id="5" name="Picture 4">
               <a:extLst>
                 <a:ext uri="{FF2B5EF4-FFF2-40B4-BE49-F238E27FC236}">
-                  <a16:creationId xmlns:a16="http://schemas.microsoft.com/office/drawing/2014/main" id="{A674E36B-1046-214F-8F85-C69D991DF469}"/>
+                  <a16:creationId xmlns:a16="http://schemas.microsoft.com/office/drawing/2014/main" id="{1BFDE913-F0EE-B944-965A-781A8F7B6BC1}"/>
                 </a:ext>
               </a:extLst>
             </p:cNvPr>
@@ -4406,250 +3752,1691 @@
             <p:nvPr/>
           </p:nvPicPr>
           <p:blipFill>
-            <a:blip r:embed="rId8"/>
+            <a:blip r:embed="rId4"/>
             <a:stretch>
               <a:fillRect/>
             </a:stretch>
           </p:blipFill>
           <p:spPr>
             <a:xfrm>
-              <a:off x="10263759" y="7099825"/>
-              <a:ext cx="2925132" cy="1477854"/>
+              <a:off x="3431373" y="671875"/>
+              <a:ext cx="4893945" cy="773430"/>
             </a:xfrm>
             <a:prstGeom prst="rect">
               <a:avLst/>
             </a:prstGeom>
           </p:spPr>
         </p:pic>
+        <p:sp>
+          <p:nvSpPr>
+            <p:cNvPr id="10" name="TextBox 9">
+              <a:extLst>
+                <a:ext uri="{FF2B5EF4-FFF2-40B4-BE49-F238E27FC236}">
+                  <a16:creationId xmlns:a16="http://schemas.microsoft.com/office/drawing/2014/main" id="{7A22E701-43A2-A243-A574-FE42918540D2}"/>
+                </a:ext>
+              </a:extLst>
+            </p:cNvPr>
+            <p:cNvSpPr txBox="1"/>
+            <p:nvPr/>
+          </p:nvSpPr>
+          <p:spPr>
+            <a:xfrm>
+              <a:off x="3862030" y="1614544"/>
+              <a:ext cx="1717137" cy="307777"/>
+            </a:xfrm>
+            <a:prstGeom prst="rect">
+              <a:avLst/>
+            </a:prstGeom>
+            <a:noFill/>
+          </p:spPr>
+          <p:txBody>
+            <a:bodyPr wrap="none" rtlCol="0">
+              <a:spAutoFit/>
+            </a:bodyPr>
+            <a:lstStyle/>
+            <a:p>
+              <a:pPr algn="ctr"/>
+              <a:r>
+                <a:rPr lang="en-US" sz="1400" dirty="0">
+                  <a:latin typeface="Times New Roman" panose="02020603050405020304" pitchFamily="18" charset="0"/>
+                  <a:cs typeface="Times New Roman" panose="02020603050405020304" pitchFamily="18" charset="0"/>
+                </a:rPr>
+                <a:t>Qubit Representation</a:t>
+              </a:r>
+            </a:p>
+          </p:txBody>
+        </p:sp>
+        <p:sp>
+          <p:nvSpPr>
+            <p:cNvPr id="11" name="TextBox 10">
+              <a:extLst>
+                <a:ext uri="{FF2B5EF4-FFF2-40B4-BE49-F238E27FC236}">
+                  <a16:creationId xmlns:a16="http://schemas.microsoft.com/office/drawing/2014/main" id="{C93C68D2-713C-564F-9D74-AADC5D178A82}"/>
+                </a:ext>
+              </a:extLst>
+            </p:cNvPr>
+            <p:cNvSpPr txBox="1"/>
+            <p:nvPr/>
+          </p:nvSpPr>
+          <p:spPr>
+            <a:xfrm>
+              <a:off x="6141435" y="2774510"/>
+              <a:ext cx="3130024" cy="384721"/>
+            </a:xfrm>
+            <a:prstGeom prst="rect">
+              <a:avLst/>
+            </a:prstGeom>
+            <a:noFill/>
+          </p:spPr>
+          <p:txBody>
+            <a:bodyPr wrap="square" rtlCol="0">
+              <a:spAutoFit/>
+            </a:bodyPr>
+            <a:lstStyle/>
+            <a:p>
+              <a:pPr algn="ctr"/>
+              <a:r>
+                <a:rPr lang="en-US" sz="1900" dirty="0">
+                  <a:latin typeface="Times New Roman" panose="02020603050405020304" pitchFamily="18" charset="0"/>
+                  <a:cs typeface="Times New Roman" panose="02020603050405020304" pitchFamily="18" charset="0"/>
+                </a:rPr>
+                <a:t>*Simultaneous Measurement*</a:t>
+              </a:r>
+            </a:p>
+          </p:txBody>
+        </p:sp>
+        <p:sp>
+          <p:nvSpPr>
+            <p:cNvPr id="13" name="TextBox 12">
+              <a:extLst>
+                <a:ext uri="{FF2B5EF4-FFF2-40B4-BE49-F238E27FC236}">
+                  <a16:creationId xmlns:a16="http://schemas.microsoft.com/office/drawing/2014/main" id="{DA49E5BB-011A-2E4B-8EC9-EE4CFB681926}"/>
+                </a:ext>
+              </a:extLst>
+            </p:cNvPr>
+            <p:cNvSpPr txBox="1"/>
+            <p:nvPr/>
+          </p:nvSpPr>
+          <p:spPr>
+            <a:xfrm>
+              <a:off x="5582403" y="3850390"/>
+              <a:ext cx="542136" cy="400110"/>
+            </a:xfrm>
+            <a:prstGeom prst="rect">
+              <a:avLst/>
+            </a:prstGeom>
+            <a:noFill/>
+          </p:spPr>
+          <p:txBody>
+            <a:bodyPr wrap="none" rtlCol="0">
+              <a:spAutoFit/>
+            </a:bodyPr>
+            <a:lstStyle/>
+            <a:p>
+              <a:r>
+                <a:rPr lang="en-US" sz="2000" dirty="0">
+                  <a:latin typeface="Times New Roman" panose="02020603050405020304" pitchFamily="18" charset="0"/>
+                  <a:cs typeface="Times New Roman" panose="02020603050405020304" pitchFamily="18" charset="0"/>
+                </a:rPr>
+                <a:t>OR</a:t>
+              </a:r>
+            </a:p>
+          </p:txBody>
+        </p:sp>
+        <p:sp>
+          <p:nvSpPr>
+            <p:cNvPr id="14" name="TextBox 13">
+              <a:extLst>
+                <a:ext uri="{FF2B5EF4-FFF2-40B4-BE49-F238E27FC236}">
+                  <a16:creationId xmlns:a16="http://schemas.microsoft.com/office/drawing/2014/main" id="{88CBEAEB-1A46-2544-A1FA-54F0E27321DC}"/>
+                </a:ext>
+              </a:extLst>
+            </p:cNvPr>
+            <p:cNvSpPr txBox="1"/>
+            <p:nvPr/>
+          </p:nvSpPr>
+          <p:spPr>
+            <a:xfrm>
+              <a:off x="2819714" y="2788558"/>
+              <a:ext cx="2759453" cy="384721"/>
+            </a:xfrm>
+            <a:prstGeom prst="rect">
+              <a:avLst/>
+            </a:prstGeom>
+            <a:noFill/>
+          </p:spPr>
+          <p:txBody>
+            <a:bodyPr wrap="square" rtlCol="0">
+              <a:spAutoFit/>
+            </a:bodyPr>
+            <a:lstStyle/>
+            <a:p>
+              <a:pPr algn="ctr"/>
+              <a:r>
+                <a:rPr lang="en-US" sz="1900" dirty="0">
+                  <a:latin typeface="Times New Roman" panose="02020603050405020304" pitchFamily="18" charset="0"/>
+                  <a:cs typeface="Times New Roman" panose="02020603050405020304" pitchFamily="18" charset="0"/>
+                </a:rPr>
+                <a:t>*Naïve Measurement*</a:t>
+              </a:r>
+            </a:p>
+          </p:txBody>
+        </p:sp>
+        <p:sp>
+          <p:nvSpPr>
+            <p:cNvPr id="205" name="TextBox 204">
+              <a:extLst>
+                <a:ext uri="{FF2B5EF4-FFF2-40B4-BE49-F238E27FC236}">
+                  <a16:creationId xmlns:a16="http://schemas.microsoft.com/office/drawing/2014/main" id="{3C11B41D-2160-9141-83C0-1D6F5D0FBA24}"/>
+                </a:ext>
+              </a:extLst>
+            </p:cNvPr>
+            <p:cNvSpPr txBox="1"/>
+            <p:nvPr/>
+          </p:nvSpPr>
+          <p:spPr>
+            <a:xfrm>
+              <a:off x="6187976" y="6453265"/>
+              <a:ext cx="2975432" cy="307777"/>
+            </a:xfrm>
+            <a:prstGeom prst="rect">
+              <a:avLst/>
+            </a:prstGeom>
+            <a:noFill/>
+          </p:spPr>
+          <p:txBody>
+            <a:bodyPr wrap="square" rtlCol="0">
+              <a:spAutoFit/>
+            </a:bodyPr>
+            <a:lstStyle/>
+            <a:p>
+              <a:pPr algn="ctr"/>
+              <a:r>
+                <a:rPr lang="en-US" sz="1400" dirty="0">
+                  <a:latin typeface="Times New Roman" panose="02020603050405020304" pitchFamily="18" charset="0"/>
+                  <a:cs typeface="Times New Roman" panose="02020603050405020304" pitchFamily="18" charset="0"/>
+                </a:rPr>
+                <a:t>Measurement Circuit Synthesis (§6)</a:t>
+              </a:r>
+            </a:p>
+          </p:txBody>
+        </p:sp>
+        <p:pic>
+          <p:nvPicPr>
+            <p:cNvPr id="7" name="Picture 6">
+              <a:extLst>
+                <a:ext uri="{FF2B5EF4-FFF2-40B4-BE49-F238E27FC236}">
+                  <a16:creationId xmlns:a16="http://schemas.microsoft.com/office/drawing/2014/main" id="{34331E85-1E32-BE4D-8A00-AEF63BB7712A}"/>
+                </a:ext>
+              </a:extLst>
+            </p:cNvPr>
+            <p:cNvPicPr>
+              <a:picLocks noChangeAspect="1"/>
+            </p:cNvPicPr>
+            <p:nvPr/>
+          </p:nvPicPr>
+          <p:blipFill>
+            <a:blip r:embed="rId5"/>
+            <a:stretch>
+              <a:fillRect/>
+            </a:stretch>
+          </p:blipFill>
+          <p:spPr>
+            <a:xfrm>
+              <a:off x="2875629" y="3170550"/>
+              <a:ext cx="2665438" cy="2091966"/>
+            </a:xfrm>
+            <a:prstGeom prst="rect">
+              <a:avLst/>
+            </a:prstGeom>
+          </p:spPr>
+        </p:pic>
+        <p:sp>
+          <p:nvSpPr>
+            <p:cNvPr id="12" name="TextBox 11">
+              <a:extLst>
+                <a:ext uri="{FF2B5EF4-FFF2-40B4-BE49-F238E27FC236}">
+                  <a16:creationId xmlns:a16="http://schemas.microsoft.com/office/drawing/2014/main" id="{C0F716CB-5854-BF45-9A50-F20C902B8354}"/>
+                </a:ext>
+              </a:extLst>
+            </p:cNvPr>
+            <p:cNvSpPr txBox="1"/>
+            <p:nvPr/>
+          </p:nvSpPr>
+          <p:spPr>
+            <a:xfrm>
+              <a:off x="3408893" y="252205"/>
+              <a:ext cx="4940550" cy="307777"/>
+            </a:xfrm>
+            <a:prstGeom prst="rect">
+              <a:avLst/>
+            </a:prstGeom>
+            <a:noFill/>
+          </p:spPr>
+          <p:txBody>
+            <a:bodyPr wrap="square" rtlCol="0">
+              <a:spAutoFit/>
+            </a:bodyPr>
+            <a:lstStyle/>
+            <a:p>
+              <a:pPr algn="ctr"/>
+              <a:r>
+                <a:rPr lang="en-US" sz="1400" dirty="0">
+                  <a:latin typeface="Times New Roman" panose="02020603050405020304" pitchFamily="18" charset="0"/>
+                  <a:cs typeface="Times New Roman" panose="02020603050405020304" pitchFamily="18" charset="0"/>
+                </a:rPr>
+                <a:t>Molecular Model (Hamiltonian)</a:t>
+              </a:r>
+            </a:p>
+          </p:txBody>
+        </p:sp>
+        <p:sp>
+          <p:nvSpPr>
+            <p:cNvPr id="16" name="Rectangle 15">
+              <a:extLst>
+                <a:ext uri="{FF2B5EF4-FFF2-40B4-BE49-F238E27FC236}">
+                  <a16:creationId xmlns:a16="http://schemas.microsoft.com/office/drawing/2014/main" id="{1D9BC04A-15B4-724E-9CA6-82E82C3473C0}"/>
+                </a:ext>
+              </a:extLst>
+            </p:cNvPr>
+            <p:cNvSpPr/>
+            <p:nvPr/>
+          </p:nvSpPr>
+          <p:spPr>
+            <a:xfrm>
+              <a:off x="3408893" y="615778"/>
+              <a:ext cx="4940550" cy="878833"/>
+            </a:xfrm>
+            <a:prstGeom prst="rect">
+              <a:avLst/>
+            </a:prstGeom>
+            <a:noFill/>
+            <a:ln>
+              <a:solidFill>
+                <a:schemeClr val="tx1"/>
+              </a:solidFill>
+            </a:ln>
+          </p:spPr>
+          <p:style>
+            <a:lnRef idx="2">
+              <a:schemeClr val="accent1">
+                <a:shade val="50000"/>
+              </a:schemeClr>
+            </a:lnRef>
+            <a:fillRef idx="1">
+              <a:schemeClr val="accent1"/>
+            </a:fillRef>
+            <a:effectRef idx="0">
+              <a:schemeClr val="accent1"/>
+            </a:effectRef>
+            <a:fontRef idx="minor">
+              <a:schemeClr val="lt1"/>
+            </a:fontRef>
+          </p:style>
+          <p:txBody>
+            <a:bodyPr rot="0" spcFirstLastPara="0" vertOverflow="overflow" horzOverflow="overflow" vert="horz" wrap="square" lIns="96012" tIns="48006" rIns="96012" bIns="48006" numCol="1" spcCol="0" rtlCol="0" fromWordArt="0" anchor="ctr" anchorCtr="0" forceAA="0" compatLnSpc="1">
+              <a:prstTxWarp prst="textNoShape">
+                <a:avLst/>
+              </a:prstTxWarp>
+              <a:noAutofit/>
+            </a:bodyPr>
+            <a:lstStyle/>
+            <a:p>
+              <a:pPr algn="ctr"/>
+              <a:endParaRPr lang="en-US" sz="2722"/>
+            </a:p>
+          </p:txBody>
+        </p:sp>
+        <p:sp>
+          <p:nvSpPr>
+            <p:cNvPr id="59" name="Rectangle 58">
+              <a:extLst>
+                <a:ext uri="{FF2B5EF4-FFF2-40B4-BE49-F238E27FC236}">
+                  <a16:creationId xmlns:a16="http://schemas.microsoft.com/office/drawing/2014/main" id="{20F504D3-1CFD-5E46-833D-735984981B15}"/>
+                </a:ext>
+              </a:extLst>
+            </p:cNvPr>
+            <p:cNvSpPr/>
+            <p:nvPr/>
+          </p:nvSpPr>
+          <p:spPr>
+            <a:xfrm>
+              <a:off x="3837303" y="2073133"/>
+              <a:ext cx="3975190" cy="476089"/>
+            </a:xfrm>
+            <a:prstGeom prst="rect">
+              <a:avLst/>
+            </a:prstGeom>
+            <a:noFill/>
+            <a:ln>
+              <a:solidFill>
+                <a:schemeClr val="tx1"/>
+              </a:solidFill>
+            </a:ln>
+          </p:spPr>
+          <p:style>
+            <a:lnRef idx="2">
+              <a:schemeClr val="accent1">
+                <a:shade val="50000"/>
+              </a:schemeClr>
+            </a:lnRef>
+            <a:fillRef idx="1">
+              <a:schemeClr val="accent1"/>
+            </a:fillRef>
+            <a:effectRef idx="0">
+              <a:schemeClr val="accent1"/>
+            </a:effectRef>
+            <a:fontRef idx="minor">
+              <a:schemeClr val="lt1"/>
+            </a:fontRef>
+          </p:style>
+          <p:txBody>
+            <a:bodyPr rot="0" spcFirstLastPara="0" vertOverflow="overflow" horzOverflow="overflow" vert="horz" wrap="square" lIns="96012" tIns="48006" rIns="96012" bIns="48006" numCol="1" spcCol="0" rtlCol="0" fromWordArt="0" anchor="ctr" anchorCtr="0" forceAA="0" compatLnSpc="1">
+              <a:prstTxWarp prst="textNoShape">
+                <a:avLst/>
+              </a:prstTxWarp>
+              <a:noAutofit/>
+            </a:bodyPr>
+            <a:lstStyle/>
+            <a:p>
+              <a:pPr algn="ctr"/>
+              <a:endParaRPr lang="en-US" sz="2722"/>
+            </a:p>
+          </p:txBody>
+        </p:sp>
+        <p:sp>
+          <p:nvSpPr>
+            <p:cNvPr id="60" name="Rectangle 59">
+              <a:extLst>
+                <a:ext uri="{FF2B5EF4-FFF2-40B4-BE49-F238E27FC236}">
+                  <a16:creationId xmlns:a16="http://schemas.microsoft.com/office/drawing/2014/main" id="{EF715F70-D1E6-A843-8A03-47A41EAC80F7}"/>
+                </a:ext>
+              </a:extLst>
+            </p:cNvPr>
+            <p:cNvSpPr/>
+            <p:nvPr/>
+          </p:nvSpPr>
+          <p:spPr>
+            <a:xfrm>
+              <a:off x="2819714" y="2775672"/>
+              <a:ext cx="2759453" cy="2486844"/>
+            </a:xfrm>
+            <a:prstGeom prst="rect">
+              <a:avLst/>
+            </a:prstGeom>
+            <a:noFill/>
+            <a:ln>
+              <a:solidFill>
+                <a:schemeClr val="tx1"/>
+              </a:solidFill>
+            </a:ln>
+          </p:spPr>
+          <p:style>
+            <a:lnRef idx="2">
+              <a:schemeClr val="accent1">
+                <a:shade val="50000"/>
+              </a:schemeClr>
+            </a:lnRef>
+            <a:fillRef idx="1">
+              <a:schemeClr val="accent1"/>
+            </a:fillRef>
+            <a:effectRef idx="0">
+              <a:schemeClr val="accent1"/>
+            </a:effectRef>
+            <a:fontRef idx="minor">
+              <a:schemeClr val="lt1"/>
+            </a:fontRef>
+          </p:style>
+          <p:txBody>
+            <a:bodyPr rot="0" spcFirstLastPara="0" vertOverflow="overflow" horzOverflow="overflow" vert="horz" wrap="square" lIns="96012" tIns="48006" rIns="96012" bIns="48006" numCol="1" spcCol="0" rtlCol="0" fromWordArt="0" anchor="ctr" anchorCtr="0" forceAA="0" compatLnSpc="1">
+              <a:prstTxWarp prst="textNoShape">
+                <a:avLst/>
+              </a:prstTxWarp>
+              <a:noAutofit/>
+            </a:bodyPr>
+            <a:lstStyle/>
+            <a:p>
+              <a:pPr algn="ctr"/>
+              <a:endParaRPr lang="en-US" sz="2722"/>
+            </a:p>
+          </p:txBody>
+        </p:sp>
+        <p:sp>
+          <p:nvSpPr>
+            <p:cNvPr id="66" name="Down Arrow 65">
+              <a:extLst>
+                <a:ext uri="{FF2B5EF4-FFF2-40B4-BE49-F238E27FC236}">
+                  <a16:creationId xmlns:a16="http://schemas.microsoft.com/office/drawing/2014/main" id="{3F51AC6A-8D17-2D45-9F67-8972D740FC97}"/>
+                </a:ext>
+              </a:extLst>
+            </p:cNvPr>
+            <p:cNvSpPr/>
+            <p:nvPr/>
+          </p:nvSpPr>
+          <p:spPr>
+            <a:xfrm>
+              <a:off x="5549893" y="1544917"/>
+              <a:ext cx="189969" cy="476089"/>
+            </a:xfrm>
+            <a:prstGeom prst="downArrow">
+              <a:avLst/>
+            </a:prstGeom>
+          </p:spPr>
+          <p:style>
+            <a:lnRef idx="2">
+              <a:schemeClr val="accent1">
+                <a:shade val="50000"/>
+              </a:schemeClr>
+            </a:lnRef>
+            <a:fillRef idx="1">
+              <a:schemeClr val="accent1"/>
+            </a:fillRef>
+            <a:effectRef idx="0">
+              <a:schemeClr val="accent1"/>
+            </a:effectRef>
+            <a:fontRef idx="minor">
+              <a:schemeClr val="lt1"/>
+            </a:fontRef>
+          </p:style>
+          <p:txBody>
+            <a:bodyPr rtlCol="0" anchor="ctr"/>
+            <a:lstStyle/>
+            <a:p>
+              <a:pPr algn="ctr"/>
+              <a:endParaRPr lang="en-US" sz="2722"/>
+            </a:p>
+          </p:txBody>
+        </p:sp>
+        <p:sp>
+          <p:nvSpPr>
+            <p:cNvPr id="17" name="Bent-Up Arrow 16">
+              <a:extLst>
+                <a:ext uri="{FF2B5EF4-FFF2-40B4-BE49-F238E27FC236}">
+                  <a16:creationId xmlns:a16="http://schemas.microsoft.com/office/drawing/2014/main" id="{CC646EC8-3955-284C-85E6-7D4755429239}"/>
+                </a:ext>
+              </a:extLst>
+            </p:cNvPr>
+            <p:cNvSpPr/>
+            <p:nvPr/>
+          </p:nvSpPr>
+          <p:spPr>
+            <a:xfrm rot="10800000">
+              <a:off x="3307291" y="2264667"/>
+              <a:ext cx="412818" cy="420362"/>
+            </a:xfrm>
+            <a:prstGeom prst="bentUpArrow">
+              <a:avLst/>
+            </a:prstGeom>
+          </p:spPr>
+          <p:style>
+            <a:lnRef idx="2">
+              <a:schemeClr val="accent1">
+                <a:shade val="50000"/>
+              </a:schemeClr>
+            </a:lnRef>
+            <a:fillRef idx="1">
+              <a:schemeClr val="accent1"/>
+            </a:fillRef>
+            <a:effectRef idx="0">
+              <a:schemeClr val="accent1"/>
+            </a:effectRef>
+            <a:fontRef idx="minor">
+              <a:schemeClr val="lt1"/>
+            </a:fontRef>
+          </p:style>
+          <p:txBody>
+            <a:bodyPr rtlCol="0" anchor="ctr"/>
+            <a:lstStyle/>
+            <a:p>
+              <a:pPr algn="ctr"/>
+              <a:endParaRPr lang="en-US"/>
+            </a:p>
+          </p:txBody>
+        </p:sp>
+        <p:sp>
+          <p:nvSpPr>
+            <p:cNvPr id="68" name="Bent-Up Arrow 67">
+              <a:extLst>
+                <a:ext uri="{FF2B5EF4-FFF2-40B4-BE49-F238E27FC236}">
+                  <a16:creationId xmlns:a16="http://schemas.microsoft.com/office/drawing/2014/main" id="{91212669-14A7-5446-AC28-FFA6F47CCF07}"/>
+                </a:ext>
+              </a:extLst>
+            </p:cNvPr>
+            <p:cNvSpPr/>
+            <p:nvPr/>
+          </p:nvSpPr>
+          <p:spPr>
+            <a:xfrm rot="10800000" flipH="1">
+              <a:off x="7866332" y="2264667"/>
+              <a:ext cx="410871" cy="420362"/>
+            </a:xfrm>
+            <a:prstGeom prst="bentUpArrow">
+              <a:avLst/>
+            </a:prstGeom>
+          </p:spPr>
+          <p:style>
+            <a:lnRef idx="2">
+              <a:schemeClr val="accent1">
+                <a:shade val="50000"/>
+              </a:schemeClr>
+            </a:lnRef>
+            <a:fillRef idx="1">
+              <a:schemeClr val="accent1"/>
+            </a:fillRef>
+            <a:effectRef idx="0">
+              <a:schemeClr val="accent1"/>
+            </a:effectRef>
+            <a:fontRef idx="minor">
+              <a:schemeClr val="lt1"/>
+            </a:fontRef>
+          </p:style>
+          <p:txBody>
+            <a:bodyPr rtlCol="0" anchor="ctr"/>
+            <a:lstStyle/>
+            <a:p>
+              <a:pPr algn="ctr"/>
+              <a:endParaRPr lang="en-US"/>
+            </a:p>
+          </p:txBody>
+        </p:sp>
+        <p:grpSp>
+          <p:nvGrpSpPr>
+            <p:cNvPr id="53" name="Group 52">
+              <a:extLst>
+                <a:ext uri="{FF2B5EF4-FFF2-40B4-BE49-F238E27FC236}">
+                  <a16:creationId xmlns:a16="http://schemas.microsoft.com/office/drawing/2014/main" id="{10247265-4A13-A84E-953B-688114695264}"/>
+                </a:ext>
+              </a:extLst>
+            </p:cNvPr>
+            <p:cNvGrpSpPr/>
+            <p:nvPr/>
+          </p:nvGrpSpPr>
+          <p:grpSpPr>
+            <a:xfrm>
+              <a:off x="6187976" y="6741755"/>
+              <a:ext cx="2964672" cy="1284655"/>
+              <a:chOff x="9735257" y="7099825"/>
+              <a:chExt cx="3453634" cy="1477854"/>
+            </a:xfrm>
+          </p:grpSpPr>
+          <p:pic>
+            <p:nvPicPr>
+              <p:cNvPr id="19" name="Picture 18">
+                <a:extLst>
+                  <a:ext uri="{FF2B5EF4-FFF2-40B4-BE49-F238E27FC236}">
+                    <a16:creationId xmlns:a16="http://schemas.microsoft.com/office/drawing/2014/main" id="{1C11714E-9E88-674E-9C74-8D4552581083}"/>
+                  </a:ext>
+                </a:extLst>
+              </p:cNvPr>
+              <p:cNvPicPr>
+                <a:picLocks noChangeAspect="1"/>
+              </p:cNvPicPr>
+              <p:nvPr/>
+            </p:nvPicPr>
+            <p:blipFill>
+              <a:blip r:embed="rId6"/>
+              <a:stretch>
+                <a:fillRect/>
+              </a:stretch>
+            </p:blipFill>
+            <p:spPr>
+              <a:xfrm>
+                <a:off x="9735257" y="7099825"/>
+                <a:ext cx="570757" cy="1477854"/>
+              </a:xfrm>
+              <a:prstGeom prst="rect">
+                <a:avLst/>
+              </a:prstGeom>
+            </p:spPr>
+          </p:pic>
+          <p:pic>
+            <p:nvPicPr>
+              <p:cNvPr id="21" name="Picture 20">
+                <a:extLst>
+                  <a:ext uri="{FF2B5EF4-FFF2-40B4-BE49-F238E27FC236}">
+                    <a16:creationId xmlns:a16="http://schemas.microsoft.com/office/drawing/2014/main" id="{A674E36B-1046-214F-8F85-C69D991DF469}"/>
+                  </a:ext>
+                </a:extLst>
+              </p:cNvPr>
+              <p:cNvPicPr>
+                <a:picLocks noChangeAspect="1"/>
+              </p:cNvPicPr>
+              <p:nvPr/>
+            </p:nvPicPr>
+            <p:blipFill>
+              <a:blip r:embed="rId7"/>
+              <a:stretch>
+                <a:fillRect/>
+              </a:stretch>
+            </p:blipFill>
+            <p:spPr>
+              <a:xfrm>
+                <a:off x="10263759" y="7099825"/>
+                <a:ext cx="2925132" cy="1477854"/>
+              </a:xfrm>
+              <a:prstGeom prst="rect">
+                <a:avLst/>
+              </a:prstGeom>
+            </p:spPr>
+          </p:pic>
+        </p:grpSp>
+        <p:sp>
+          <p:nvSpPr>
+            <p:cNvPr id="6" name="TextBox 5">
+              <a:extLst>
+                <a:ext uri="{FF2B5EF4-FFF2-40B4-BE49-F238E27FC236}">
+                  <a16:creationId xmlns:a16="http://schemas.microsoft.com/office/drawing/2014/main" id="{F6F5B79D-6087-7142-A19B-81B52F6BCD52}"/>
+                </a:ext>
+              </a:extLst>
+            </p:cNvPr>
+            <p:cNvSpPr txBox="1"/>
+            <p:nvPr/>
+          </p:nvSpPr>
+          <p:spPr>
+            <a:xfrm>
+              <a:off x="3258268" y="8331926"/>
+              <a:ext cx="1892127" cy="369332"/>
+            </a:xfrm>
+            <a:prstGeom prst="rect">
+              <a:avLst/>
+            </a:prstGeom>
+            <a:noFill/>
+          </p:spPr>
+          <p:txBody>
+            <a:bodyPr wrap="none" rtlCol="0">
+              <a:spAutoFit/>
+            </a:bodyPr>
+            <a:lstStyle/>
+            <a:p>
+              <a:r>
+                <a:rPr lang="en-US" sz="1800" b="1" dirty="0">
+                  <a:latin typeface="Times New Roman" panose="02020603050405020304" pitchFamily="18" charset="0"/>
+                  <a:cs typeface="Times New Roman" panose="02020603050405020304" pitchFamily="18" charset="0"/>
+                </a:rPr>
+                <a:t>14 measurements</a:t>
+              </a:r>
+            </a:p>
+          </p:txBody>
+        </p:sp>
+        <p:sp>
+          <p:nvSpPr>
+            <p:cNvPr id="45" name="TextBox 44">
+              <a:extLst>
+                <a:ext uri="{FF2B5EF4-FFF2-40B4-BE49-F238E27FC236}">
+                  <a16:creationId xmlns:a16="http://schemas.microsoft.com/office/drawing/2014/main" id="{9E773474-E024-1D49-ACAF-273612621E6D}"/>
+                </a:ext>
+              </a:extLst>
+            </p:cNvPr>
+            <p:cNvSpPr txBox="1"/>
+            <p:nvPr/>
+          </p:nvSpPr>
+          <p:spPr>
+            <a:xfrm>
+              <a:off x="4692757" y="6639876"/>
+              <a:ext cx="1275835" cy="523220"/>
+            </a:xfrm>
+            <a:prstGeom prst="rect">
+              <a:avLst/>
+            </a:prstGeom>
+            <a:noFill/>
+          </p:spPr>
+          <p:txBody>
+            <a:bodyPr wrap="square" rtlCol="0">
+              <a:spAutoFit/>
+            </a:bodyPr>
+            <a:lstStyle/>
+            <a:p>
+              <a:pPr algn="ctr"/>
+              <a:r>
+                <a:rPr lang="en-US" sz="1400" dirty="0">
+                  <a:latin typeface="Times New Roman" panose="02020603050405020304" pitchFamily="18" charset="0"/>
+                  <a:cs typeface="Times New Roman" panose="02020603050405020304" pitchFamily="18" charset="0"/>
+                </a:rPr>
+                <a:t>Covariance</a:t>
+              </a:r>
+            </a:p>
+            <a:p>
+              <a:pPr algn="ctr"/>
+              <a:r>
+                <a:rPr lang="en-US" sz="1400" dirty="0">
+                  <a:latin typeface="Times New Roman" panose="02020603050405020304" pitchFamily="18" charset="0"/>
+                  <a:cs typeface="Times New Roman" panose="02020603050405020304" pitchFamily="18" charset="0"/>
+                </a:rPr>
+                <a:t>Mitigation (§9)</a:t>
+              </a:r>
+            </a:p>
+          </p:txBody>
+        </p:sp>
+        <p:pic>
+          <p:nvPicPr>
+            <p:cNvPr id="18" name="Picture 17">
+              <a:extLst>
+                <a:ext uri="{FF2B5EF4-FFF2-40B4-BE49-F238E27FC236}">
+                  <a16:creationId xmlns:a16="http://schemas.microsoft.com/office/drawing/2014/main" id="{DE526BF7-BCB4-0643-9A26-8F75669A65B6}"/>
+                </a:ext>
+              </a:extLst>
+            </p:cNvPr>
+            <p:cNvPicPr>
+              <a:picLocks noChangeAspect="1"/>
+            </p:cNvPicPr>
+            <p:nvPr/>
+          </p:nvPicPr>
+          <p:blipFill rotWithShape="1">
+            <a:blip r:embed="rId8"/>
+            <a:srcRect l="16363" t="60038" b="-1"/>
+            <a:stretch/>
+          </p:blipFill>
+          <p:spPr>
+            <a:xfrm>
+              <a:off x="4622381" y="7355462"/>
+              <a:ext cx="1370544" cy="231129"/>
+            </a:xfrm>
+            <a:prstGeom prst="rect">
+              <a:avLst/>
+            </a:prstGeom>
+          </p:spPr>
+        </p:pic>
+        <p:pic>
+          <p:nvPicPr>
+            <p:cNvPr id="49" name="Picture 48">
+              <a:extLst>
+                <a:ext uri="{FF2B5EF4-FFF2-40B4-BE49-F238E27FC236}">
+                  <a16:creationId xmlns:a16="http://schemas.microsoft.com/office/drawing/2014/main" id="{9A6F5781-A6D1-314E-B185-421AB9541BD4}"/>
+                </a:ext>
+              </a:extLst>
+            </p:cNvPr>
+            <p:cNvPicPr>
+              <a:picLocks noChangeAspect="1"/>
+            </p:cNvPicPr>
+            <p:nvPr/>
+          </p:nvPicPr>
+          <p:blipFill rotWithShape="1">
+            <a:blip r:embed="rId8"/>
+            <a:srcRect r="31297" b="60037"/>
+            <a:stretch/>
+          </p:blipFill>
+          <p:spPr>
+            <a:xfrm>
+              <a:off x="4787679" y="7155827"/>
+              <a:ext cx="1174772" cy="241178"/>
+            </a:xfrm>
+            <a:prstGeom prst="rect">
+              <a:avLst/>
+            </a:prstGeom>
+          </p:spPr>
+        </p:pic>
+        <p:sp>
+          <p:nvSpPr>
+            <p:cNvPr id="2" name="Rectangle 1">
+              <a:extLst>
+                <a:ext uri="{FF2B5EF4-FFF2-40B4-BE49-F238E27FC236}">
+                  <a16:creationId xmlns:a16="http://schemas.microsoft.com/office/drawing/2014/main" id="{1AC6B1EB-830C-8243-8B4D-E0ACE021B8D1}"/>
+                </a:ext>
+              </a:extLst>
+            </p:cNvPr>
+            <p:cNvSpPr/>
+            <p:nvPr/>
+          </p:nvSpPr>
+          <p:spPr>
+            <a:xfrm>
+              <a:off x="6221786" y="6421236"/>
+              <a:ext cx="2941621" cy="1605174"/>
+            </a:xfrm>
+            <a:prstGeom prst="rect">
+              <a:avLst/>
+            </a:prstGeom>
+            <a:noFill/>
+          </p:spPr>
+          <p:style>
+            <a:lnRef idx="2">
+              <a:schemeClr val="accent1">
+                <a:shade val="50000"/>
+              </a:schemeClr>
+            </a:lnRef>
+            <a:fillRef idx="1">
+              <a:schemeClr val="accent1"/>
+            </a:fillRef>
+            <a:effectRef idx="0">
+              <a:schemeClr val="accent1"/>
+            </a:effectRef>
+            <a:fontRef idx="minor">
+              <a:schemeClr val="lt1"/>
+            </a:fontRef>
+          </p:style>
+          <p:txBody>
+            <a:bodyPr rtlCol="0" anchor="ctr"/>
+            <a:lstStyle/>
+            <a:p>
+              <a:pPr algn="ctr"/>
+              <a:endParaRPr lang="en-US"/>
+            </a:p>
+          </p:txBody>
+        </p:sp>
+        <p:sp>
+          <p:nvSpPr>
+            <p:cNvPr id="28" name="Rectangle 27">
+              <a:extLst>
+                <a:ext uri="{FF2B5EF4-FFF2-40B4-BE49-F238E27FC236}">
+                  <a16:creationId xmlns:a16="http://schemas.microsoft.com/office/drawing/2014/main" id="{1448EFED-542F-374A-B2B8-747FF90BF577}"/>
+                </a:ext>
+              </a:extLst>
+            </p:cNvPr>
+            <p:cNvSpPr/>
+            <p:nvPr/>
+          </p:nvSpPr>
+          <p:spPr>
+            <a:xfrm>
+              <a:off x="6221787" y="3176685"/>
+              <a:ext cx="2956748" cy="3186640"/>
+            </a:xfrm>
+            <a:prstGeom prst="rect">
+              <a:avLst/>
+            </a:prstGeom>
+            <a:noFill/>
+          </p:spPr>
+          <p:style>
+            <a:lnRef idx="2">
+              <a:schemeClr val="accent1">
+                <a:shade val="50000"/>
+              </a:schemeClr>
+            </a:lnRef>
+            <a:fillRef idx="1">
+              <a:schemeClr val="accent1"/>
+            </a:fillRef>
+            <a:effectRef idx="0">
+              <a:schemeClr val="accent1"/>
+            </a:effectRef>
+            <a:fontRef idx="minor">
+              <a:schemeClr val="lt1"/>
+            </a:fontRef>
+          </p:style>
+          <p:txBody>
+            <a:bodyPr rtlCol="0" anchor="ctr"/>
+            <a:lstStyle/>
+            <a:p>
+              <a:pPr algn="ctr"/>
+              <a:endParaRPr lang="en-US"/>
+            </a:p>
+          </p:txBody>
+        </p:sp>
+        <p:sp>
+          <p:nvSpPr>
+            <p:cNvPr id="29" name="Rectangle 28">
+              <a:extLst>
+                <a:ext uri="{FF2B5EF4-FFF2-40B4-BE49-F238E27FC236}">
+                  <a16:creationId xmlns:a16="http://schemas.microsoft.com/office/drawing/2014/main" id="{A9D90C35-56B1-3943-A3D5-BC726605FDBC}"/>
+                </a:ext>
+              </a:extLst>
+            </p:cNvPr>
+            <p:cNvSpPr/>
+            <p:nvPr/>
+          </p:nvSpPr>
+          <p:spPr>
+            <a:xfrm>
+              <a:off x="6132605" y="2777977"/>
+              <a:ext cx="3152174" cy="5345644"/>
+            </a:xfrm>
+            <a:prstGeom prst="rect">
+              <a:avLst/>
+            </a:prstGeom>
+            <a:noFill/>
+            <a:ln>
+              <a:solidFill>
+                <a:schemeClr val="tx1"/>
+              </a:solidFill>
+            </a:ln>
+          </p:spPr>
+          <p:style>
+            <a:lnRef idx="2">
+              <a:schemeClr val="accent1">
+                <a:shade val="50000"/>
+              </a:schemeClr>
+            </a:lnRef>
+            <a:fillRef idx="1">
+              <a:schemeClr val="accent1"/>
+            </a:fillRef>
+            <a:effectRef idx="0">
+              <a:schemeClr val="accent1"/>
+            </a:effectRef>
+            <a:fontRef idx="minor">
+              <a:schemeClr val="lt1"/>
+            </a:fontRef>
+          </p:style>
+          <p:txBody>
+            <a:bodyPr rot="0" spcFirstLastPara="0" vertOverflow="overflow" horzOverflow="overflow" vert="horz" wrap="square" lIns="96012" tIns="48006" rIns="96012" bIns="48006" numCol="1" spcCol="0" rtlCol="0" fromWordArt="0" anchor="ctr" anchorCtr="0" forceAA="0" compatLnSpc="1">
+              <a:prstTxWarp prst="textNoShape">
+                <a:avLst/>
+              </a:prstTxWarp>
+              <a:noAutofit/>
+            </a:bodyPr>
+            <a:lstStyle/>
+            <a:p>
+              <a:pPr algn="ctr"/>
+              <a:endParaRPr lang="en-US" sz="2722"/>
+            </a:p>
+          </p:txBody>
+        </p:sp>
+        <p:sp>
+          <p:nvSpPr>
+            <p:cNvPr id="39" name="TextBox 38">
+              <a:extLst>
+                <a:ext uri="{FF2B5EF4-FFF2-40B4-BE49-F238E27FC236}">
+                  <a16:creationId xmlns:a16="http://schemas.microsoft.com/office/drawing/2014/main" id="{A7828B74-9C7A-204A-8C0F-C0C8D2AA8592}"/>
+                </a:ext>
+              </a:extLst>
+            </p:cNvPr>
+            <p:cNvSpPr txBox="1"/>
+            <p:nvPr/>
+          </p:nvSpPr>
+          <p:spPr>
+            <a:xfrm>
+              <a:off x="4100928" y="2055708"/>
+              <a:ext cx="4079463" cy="523220"/>
+            </a:xfrm>
+            <a:prstGeom prst="rect">
+              <a:avLst/>
+            </a:prstGeom>
+            <a:noFill/>
+          </p:spPr>
+          <p:txBody>
+            <a:bodyPr wrap="square" rtlCol="0">
+              <a:spAutoFit/>
+            </a:bodyPr>
+            <a:lstStyle/>
+            <a:p>
+              <a:r>
+                <a:rPr lang="en-US" sz="2800" dirty="0"/>
+                <a:t>XIXY + XXYY + ZZII + …</a:t>
+              </a:r>
+            </a:p>
+          </p:txBody>
+        </p:sp>
+        <p:sp>
+          <p:nvSpPr>
+            <p:cNvPr id="40" name="Down Arrow 39">
+              <a:extLst>
+                <a:ext uri="{FF2B5EF4-FFF2-40B4-BE49-F238E27FC236}">
+                  <a16:creationId xmlns:a16="http://schemas.microsoft.com/office/drawing/2014/main" id="{B54055A2-886F-0543-B342-AED53DC154AE}"/>
+                </a:ext>
+              </a:extLst>
+            </p:cNvPr>
+            <p:cNvSpPr/>
+            <p:nvPr/>
+          </p:nvSpPr>
+          <p:spPr>
+            <a:xfrm>
+              <a:off x="4113363" y="5262515"/>
+              <a:ext cx="189969" cy="3144185"/>
+            </a:xfrm>
+            <a:prstGeom prst="downArrow">
+              <a:avLst/>
+            </a:prstGeom>
+          </p:spPr>
+          <p:style>
+            <a:lnRef idx="2">
+              <a:schemeClr val="accent1">
+                <a:shade val="50000"/>
+              </a:schemeClr>
+            </a:lnRef>
+            <a:fillRef idx="1">
+              <a:schemeClr val="accent1"/>
+            </a:fillRef>
+            <a:effectRef idx="0">
+              <a:schemeClr val="accent1"/>
+            </a:effectRef>
+            <a:fontRef idx="minor">
+              <a:schemeClr val="lt1"/>
+            </a:fontRef>
+          </p:style>
+          <p:txBody>
+            <a:bodyPr rtlCol="0" anchor="ctr"/>
+            <a:lstStyle/>
+            <a:p>
+              <a:pPr algn="ctr"/>
+              <a:endParaRPr lang="en-US" sz="2722"/>
+            </a:p>
+          </p:txBody>
+        </p:sp>
+        <p:sp>
+          <p:nvSpPr>
+            <p:cNvPr id="43" name="TextBox 42">
+              <a:extLst>
+                <a:ext uri="{FF2B5EF4-FFF2-40B4-BE49-F238E27FC236}">
+                  <a16:creationId xmlns:a16="http://schemas.microsoft.com/office/drawing/2014/main" id="{F0A05B58-1C47-F34B-B5DB-650B558DFF00}"/>
+                </a:ext>
+              </a:extLst>
+            </p:cNvPr>
+            <p:cNvSpPr txBox="1"/>
+            <p:nvPr/>
+          </p:nvSpPr>
+          <p:spPr>
+            <a:xfrm>
+              <a:off x="6211255" y="3182485"/>
+              <a:ext cx="2975432" cy="307777"/>
+            </a:xfrm>
+            <a:prstGeom prst="rect">
+              <a:avLst/>
+            </a:prstGeom>
+            <a:noFill/>
+          </p:spPr>
+          <p:txBody>
+            <a:bodyPr wrap="square" rtlCol="0">
+              <a:spAutoFit/>
+            </a:bodyPr>
+            <a:lstStyle/>
+            <a:p>
+              <a:pPr algn="ctr"/>
+              <a:r>
+                <a:rPr lang="en-US" sz="1400" dirty="0">
+                  <a:latin typeface="Times New Roman" panose="02020603050405020304" pitchFamily="18" charset="0"/>
+                  <a:cs typeface="Times New Roman" panose="02020603050405020304" pitchFamily="18" charset="0"/>
+                </a:rPr>
+                <a:t>Transpilation (§4-5)</a:t>
+              </a:r>
+            </a:p>
+          </p:txBody>
+        </p:sp>
+        <p:sp>
+          <p:nvSpPr>
+            <p:cNvPr id="46" name="Rectangle 45">
+              <a:extLst>
+                <a:ext uri="{FF2B5EF4-FFF2-40B4-BE49-F238E27FC236}">
+                  <a16:creationId xmlns:a16="http://schemas.microsoft.com/office/drawing/2014/main" id="{6DD7F375-ECF7-914C-A02E-015467D26524}"/>
+                </a:ext>
+              </a:extLst>
+            </p:cNvPr>
+            <p:cNvSpPr/>
+            <p:nvPr/>
+          </p:nvSpPr>
+          <p:spPr>
+            <a:xfrm>
+              <a:off x="4664294" y="6666390"/>
+              <a:ext cx="1338253" cy="942686"/>
+            </a:xfrm>
+            <a:prstGeom prst="rect">
+              <a:avLst/>
+            </a:prstGeom>
+            <a:noFill/>
+          </p:spPr>
+          <p:style>
+            <a:lnRef idx="2">
+              <a:schemeClr val="accent1">
+                <a:shade val="50000"/>
+              </a:schemeClr>
+            </a:lnRef>
+            <a:fillRef idx="1">
+              <a:schemeClr val="accent1"/>
+            </a:fillRef>
+            <a:effectRef idx="0">
+              <a:schemeClr val="accent1"/>
+            </a:effectRef>
+            <a:fontRef idx="minor">
+              <a:schemeClr val="lt1"/>
+            </a:fontRef>
+          </p:style>
+          <p:txBody>
+            <a:bodyPr rtlCol="0" anchor="ctr"/>
+            <a:lstStyle/>
+            <a:p>
+              <a:pPr algn="ctr"/>
+              <a:endParaRPr lang="en-US"/>
+            </a:p>
+          </p:txBody>
+        </p:sp>
+        <p:cxnSp>
+          <p:nvCxnSpPr>
+            <p:cNvPr id="30" name="Elbow Connector 29">
+              <a:extLst>
+                <a:ext uri="{FF2B5EF4-FFF2-40B4-BE49-F238E27FC236}">
+                  <a16:creationId xmlns:a16="http://schemas.microsoft.com/office/drawing/2014/main" id="{6488C3C3-12F2-2540-9EC8-6287AABA5164}"/>
+                </a:ext>
+              </a:extLst>
+            </p:cNvPr>
+            <p:cNvCxnSpPr>
+              <a:cxnSpLocks/>
+            </p:cNvCxnSpPr>
+            <p:nvPr/>
+          </p:nvCxnSpPr>
+          <p:spPr>
+            <a:xfrm rot="10800000">
+              <a:off x="5582405" y="7609076"/>
+              <a:ext cx="1294878" cy="907516"/>
+            </a:xfrm>
+            <a:prstGeom prst="bentConnector2">
+              <a:avLst/>
+            </a:prstGeom>
+            <a:ln w="28575">
+              <a:prstDash val="sysDot"/>
+              <a:tailEnd type="triangle"/>
+            </a:ln>
+          </p:spPr>
+          <p:style>
+            <a:lnRef idx="1">
+              <a:schemeClr val="accent1"/>
+            </a:lnRef>
+            <a:fillRef idx="0">
+              <a:schemeClr val="accent1"/>
+            </a:fillRef>
+            <a:effectRef idx="0">
+              <a:schemeClr val="accent1"/>
+            </a:effectRef>
+            <a:fontRef idx="minor">
+              <a:schemeClr val="tx1"/>
+            </a:fontRef>
+          </p:style>
+        </p:cxnSp>
+        <p:sp>
+          <p:nvSpPr>
+            <p:cNvPr id="51" name="Down Arrow 50">
+              <a:extLst>
+                <a:ext uri="{FF2B5EF4-FFF2-40B4-BE49-F238E27FC236}">
+                  <a16:creationId xmlns:a16="http://schemas.microsoft.com/office/drawing/2014/main" id="{4BE45115-1395-B745-99DE-E1B9DABA19C7}"/>
+                </a:ext>
+              </a:extLst>
+            </p:cNvPr>
+            <p:cNvSpPr/>
+            <p:nvPr/>
+          </p:nvSpPr>
+          <p:spPr>
+            <a:xfrm>
+              <a:off x="7512073" y="8689782"/>
+              <a:ext cx="189969" cy="503450"/>
+            </a:xfrm>
+            <a:prstGeom prst="downArrow">
+              <a:avLst/>
+            </a:prstGeom>
+          </p:spPr>
+          <p:style>
+            <a:lnRef idx="2">
+              <a:schemeClr val="accent1">
+                <a:shade val="50000"/>
+              </a:schemeClr>
+            </a:lnRef>
+            <a:fillRef idx="1">
+              <a:schemeClr val="accent1"/>
+            </a:fillRef>
+            <a:effectRef idx="0">
+              <a:schemeClr val="accent1"/>
+            </a:effectRef>
+            <a:fontRef idx="minor">
+              <a:schemeClr val="lt1"/>
+            </a:fontRef>
+          </p:style>
+          <p:txBody>
+            <a:bodyPr rtlCol="0" anchor="ctr"/>
+            <a:lstStyle/>
+            <a:p>
+              <a:pPr algn="ctr"/>
+              <a:endParaRPr lang="en-US" sz="2722"/>
+            </a:p>
+          </p:txBody>
+        </p:sp>
+        <p:sp>
+          <p:nvSpPr>
+            <p:cNvPr id="52" name="TextBox 51">
+              <a:extLst>
+                <a:ext uri="{FF2B5EF4-FFF2-40B4-BE49-F238E27FC236}">
+                  <a16:creationId xmlns:a16="http://schemas.microsoft.com/office/drawing/2014/main" id="{28C6650B-EA2C-5643-81B8-31002C7872CF}"/>
+                </a:ext>
+              </a:extLst>
+            </p:cNvPr>
+            <p:cNvSpPr txBox="1"/>
+            <p:nvPr/>
+          </p:nvSpPr>
+          <p:spPr>
+            <a:xfrm>
+              <a:off x="6428277" y="9151789"/>
+              <a:ext cx="2351200" cy="369332"/>
+            </a:xfrm>
+            <a:prstGeom prst="rect">
+              <a:avLst/>
+            </a:prstGeom>
+            <a:noFill/>
+          </p:spPr>
+          <p:txBody>
+            <a:bodyPr wrap="none" rtlCol="0">
+              <a:spAutoFit/>
+            </a:bodyPr>
+            <a:lstStyle/>
+            <a:p>
+              <a:r>
+                <a:rPr lang="en-US" sz="1800" dirty="0">
+                  <a:latin typeface="Times New Roman" panose="02020603050405020304" pitchFamily="18" charset="0"/>
+                  <a:cs typeface="Times New Roman" panose="02020603050405020304" pitchFamily="18" charset="0"/>
+                </a:rPr>
+                <a:t>14 measurement values</a:t>
+              </a:r>
+            </a:p>
+          </p:txBody>
+        </p:sp>
+        <p:sp>
+          <p:nvSpPr>
+            <p:cNvPr id="56" name="Bent-Up Arrow 55">
+              <a:extLst>
+                <a:ext uri="{FF2B5EF4-FFF2-40B4-BE49-F238E27FC236}">
+                  <a16:creationId xmlns:a16="http://schemas.microsoft.com/office/drawing/2014/main" id="{4A0456A5-58D1-ED43-9780-E04F4CB85790}"/>
+                </a:ext>
+              </a:extLst>
+            </p:cNvPr>
+            <p:cNvSpPr/>
+            <p:nvPr/>
+          </p:nvSpPr>
+          <p:spPr>
+            <a:xfrm rot="10800000" flipH="1">
+              <a:off x="8459629" y="972153"/>
+              <a:ext cx="410871" cy="1725996"/>
+            </a:xfrm>
+            <a:prstGeom prst="bentUpArrow">
+              <a:avLst/>
+            </a:prstGeom>
+          </p:spPr>
+          <p:style>
+            <a:lnRef idx="2">
+              <a:schemeClr val="accent1">
+                <a:shade val="50000"/>
+              </a:schemeClr>
+            </a:lnRef>
+            <a:fillRef idx="1">
+              <a:schemeClr val="accent1"/>
+            </a:fillRef>
+            <a:effectRef idx="0">
+              <a:schemeClr val="accent1"/>
+            </a:effectRef>
+            <a:fontRef idx="minor">
+              <a:schemeClr val="lt1"/>
+            </a:fontRef>
+          </p:style>
+          <p:txBody>
+            <a:bodyPr rtlCol="0" anchor="ctr"/>
+            <a:lstStyle/>
+            <a:p>
+              <a:pPr algn="ctr"/>
+              <a:endParaRPr lang="en-US"/>
+            </a:p>
+          </p:txBody>
+        </p:sp>
+        <p:sp>
+          <p:nvSpPr>
+            <p:cNvPr id="57" name="TextBox 56">
+              <a:extLst>
+                <a:ext uri="{FF2B5EF4-FFF2-40B4-BE49-F238E27FC236}">
+                  <a16:creationId xmlns:a16="http://schemas.microsoft.com/office/drawing/2014/main" id="{ABC30210-48FF-BB45-93CF-B6ECBBB3BB94}"/>
+                </a:ext>
+              </a:extLst>
+            </p:cNvPr>
+            <p:cNvSpPr txBox="1"/>
+            <p:nvPr/>
+          </p:nvSpPr>
+          <p:spPr>
+            <a:xfrm>
+              <a:off x="8214082" y="2216999"/>
+              <a:ext cx="542136" cy="400110"/>
+            </a:xfrm>
+            <a:prstGeom prst="rect">
+              <a:avLst/>
+            </a:prstGeom>
+            <a:noFill/>
+          </p:spPr>
+          <p:txBody>
+            <a:bodyPr wrap="none" rtlCol="0">
+              <a:spAutoFit/>
+            </a:bodyPr>
+            <a:lstStyle/>
+            <a:p>
+              <a:r>
+                <a:rPr lang="en-US" sz="2000" dirty="0">
+                  <a:latin typeface="Times New Roman" panose="02020603050405020304" pitchFamily="18" charset="0"/>
+                  <a:cs typeface="Times New Roman" panose="02020603050405020304" pitchFamily="18" charset="0"/>
+                </a:rPr>
+                <a:t>OR</a:t>
+              </a:r>
+            </a:p>
+          </p:txBody>
+        </p:sp>
+        <p:cxnSp>
+          <p:nvCxnSpPr>
+            <p:cNvPr id="58" name="Elbow Connector 57">
+              <a:extLst>
+                <a:ext uri="{FF2B5EF4-FFF2-40B4-BE49-F238E27FC236}">
+                  <a16:creationId xmlns:a16="http://schemas.microsoft.com/office/drawing/2014/main" id="{8B47E2D0-6B79-4E4B-9296-AC59564F5F6E}"/>
+                </a:ext>
+              </a:extLst>
+            </p:cNvPr>
+            <p:cNvCxnSpPr>
+              <a:cxnSpLocks/>
+              <a:endCxn id="29" idx="1"/>
+            </p:cNvCxnSpPr>
+            <p:nvPr/>
+          </p:nvCxnSpPr>
+          <p:spPr>
+            <a:xfrm rot="5400000" flipH="1" flipV="1">
+              <a:off x="5262967" y="5770238"/>
+              <a:ext cx="1189077" cy="550200"/>
+            </a:xfrm>
+            <a:prstGeom prst="bentConnector2">
+              <a:avLst/>
+            </a:prstGeom>
+            <a:ln w="28575">
+              <a:prstDash val="sysDot"/>
+              <a:tailEnd type="triangle"/>
+            </a:ln>
+          </p:spPr>
+          <p:style>
+            <a:lnRef idx="1">
+              <a:schemeClr val="accent1"/>
+            </a:lnRef>
+            <a:fillRef idx="0">
+              <a:schemeClr val="accent1"/>
+            </a:fillRef>
+            <a:effectRef idx="0">
+              <a:schemeClr val="accent1"/>
+            </a:effectRef>
+            <a:fontRef idx="minor">
+              <a:schemeClr val="tx1"/>
+            </a:fontRef>
+          </p:style>
+        </p:cxnSp>
+        <p:sp>
+          <p:nvSpPr>
+            <p:cNvPr id="61" name="TextBox 60">
+              <a:extLst>
+                <a:ext uri="{FF2B5EF4-FFF2-40B4-BE49-F238E27FC236}">
+                  <a16:creationId xmlns:a16="http://schemas.microsoft.com/office/drawing/2014/main" id="{8C6347CB-BB41-814B-96B8-E0DD098D8A35}"/>
+                </a:ext>
+              </a:extLst>
+            </p:cNvPr>
+            <p:cNvSpPr txBox="1"/>
+            <p:nvPr/>
+          </p:nvSpPr>
+          <p:spPr>
+            <a:xfrm>
+              <a:off x="7870108" y="1995160"/>
+              <a:ext cx="393280" cy="307777"/>
+            </a:xfrm>
+            <a:prstGeom prst="rect">
+              <a:avLst/>
+            </a:prstGeom>
+            <a:noFill/>
+          </p:spPr>
+          <p:txBody>
+            <a:bodyPr wrap="square" rtlCol="0">
+              <a:spAutoFit/>
+            </a:bodyPr>
+            <a:lstStyle/>
+            <a:p>
+              <a:pPr algn="ctr"/>
+              <a:r>
+                <a:rPr lang="en-US" sz="1400" dirty="0">
+                  <a:latin typeface="Times New Roman" panose="02020603050405020304" pitchFamily="18" charset="0"/>
+                  <a:cs typeface="Times New Roman" panose="02020603050405020304" pitchFamily="18" charset="0"/>
+                </a:rPr>
+                <a:t>§4</a:t>
+              </a:r>
+            </a:p>
+          </p:txBody>
+        </p:sp>
+        <p:sp>
+          <p:nvSpPr>
+            <p:cNvPr id="62" name="TextBox 61">
+              <a:extLst>
+                <a:ext uri="{FF2B5EF4-FFF2-40B4-BE49-F238E27FC236}">
+                  <a16:creationId xmlns:a16="http://schemas.microsoft.com/office/drawing/2014/main" id="{1D37CDE5-FA38-114F-B02B-886DB33C9A27}"/>
+                </a:ext>
+              </a:extLst>
+            </p:cNvPr>
+            <p:cNvSpPr txBox="1"/>
+            <p:nvPr/>
+          </p:nvSpPr>
+          <p:spPr>
+            <a:xfrm>
+              <a:off x="8742004" y="1997069"/>
+              <a:ext cx="393280" cy="307777"/>
+            </a:xfrm>
+            <a:prstGeom prst="rect">
+              <a:avLst/>
+            </a:prstGeom>
+            <a:noFill/>
+          </p:spPr>
+          <p:txBody>
+            <a:bodyPr wrap="square" rtlCol="0">
+              <a:spAutoFit/>
+            </a:bodyPr>
+            <a:lstStyle/>
+            <a:p>
+              <a:pPr algn="ctr"/>
+              <a:r>
+                <a:rPr lang="en-US" sz="1400" dirty="0">
+                  <a:latin typeface="Times New Roman" panose="02020603050405020304" pitchFamily="18" charset="0"/>
+                  <a:cs typeface="Times New Roman" panose="02020603050405020304" pitchFamily="18" charset="0"/>
+                </a:rPr>
+                <a:t>§5</a:t>
+              </a:r>
+            </a:p>
+          </p:txBody>
+        </p:sp>
+        <p:sp>
+          <p:nvSpPr>
+            <p:cNvPr id="44" name="TextBox 43">
+              <a:extLst>
+                <a:ext uri="{FF2B5EF4-FFF2-40B4-BE49-F238E27FC236}">
+                  <a16:creationId xmlns:a16="http://schemas.microsoft.com/office/drawing/2014/main" id="{28C6650B-EA2C-5643-81B8-31002C7872CF}"/>
+                </a:ext>
+              </a:extLst>
+            </p:cNvPr>
+            <p:cNvSpPr txBox="1"/>
+            <p:nvPr/>
+          </p:nvSpPr>
+          <p:spPr>
+            <a:xfrm>
+              <a:off x="3066013" y="9151789"/>
+              <a:ext cx="2351200" cy="369332"/>
+            </a:xfrm>
+            <a:prstGeom prst="rect">
+              <a:avLst/>
+            </a:prstGeom>
+            <a:noFill/>
+          </p:spPr>
+          <p:txBody>
+            <a:bodyPr wrap="none" rtlCol="0">
+              <a:spAutoFit/>
+            </a:bodyPr>
+            <a:lstStyle/>
+            <a:p>
+              <a:r>
+                <a:rPr lang="en-US" sz="1800" dirty="0">
+                  <a:latin typeface="Times New Roman" panose="02020603050405020304" pitchFamily="18" charset="0"/>
+                  <a:cs typeface="Times New Roman" panose="02020603050405020304" pitchFamily="18" charset="0"/>
+                </a:rPr>
+                <a:t>14 measurement values</a:t>
+              </a:r>
+            </a:p>
+          </p:txBody>
+        </p:sp>
+        <p:sp>
+          <p:nvSpPr>
+            <p:cNvPr id="47" name="Down Arrow 46">
+              <a:extLst>
+                <a:ext uri="{FF2B5EF4-FFF2-40B4-BE49-F238E27FC236}">
+                  <a16:creationId xmlns:a16="http://schemas.microsoft.com/office/drawing/2014/main" id="{4BE45115-1395-B745-99DE-E1B9DABA19C7}"/>
+                </a:ext>
+              </a:extLst>
+            </p:cNvPr>
+            <p:cNvSpPr/>
+            <p:nvPr/>
+          </p:nvSpPr>
+          <p:spPr>
+            <a:xfrm>
+              <a:off x="4113363" y="8701258"/>
+              <a:ext cx="189969" cy="450531"/>
+            </a:xfrm>
+            <a:prstGeom prst="downArrow">
+              <a:avLst/>
+            </a:prstGeom>
+          </p:spPr>
+          <p:style>
+            <a:lnRef idx="2">
+              <a:schemeClr val="accent1">
+                <a:shade val="50000"/>
+              </a:schemeClr>
+            </a:lnRef>
+            <a:fillRef idx="1">
+              <a:schemeClr val="accent1"/>
+            </a:fillRef>
+            <a:effectRef idx="0">
+              <a:schemeClr val="accent1"/>
+            </a:effectRef>
+            <a:fontRef idx="minor">
+              <a:schemeClr val="lt1"/>
+            </a:fontRef>
+          </p:style>
+          <p:txBody>
+            <a:bodyPr rtlCol="0" anchor="ctr"/>
+            <a:lstStyle/>
+            <a:p>
+              <a:pPr algn="ctr"/>
+              <a:endParaRPr lang="en-US" sz="2722"/>
+            </a:p>
+          </p:txBody>
+        </p:sp>
+        <p:sp>
+          <p:nvSpPr>
+            <p:cNvPr id="41" name="TextBox 40">
+              <a:extLst>
+                <a:ext uri="{FF2B5EF4-FFF2-40B4-BE49-F238E27FC236}">
+                  <a16:creationId xmlns:a16="http://schemas.microsoft.com/office/drawing/2014/main" id="{AC3E7C8E-F437-AE4C-B1E7-3F08CE17254E}"/>
+                </a:ext>
+              </a:extLst>
+            </p:cNvPr>
+            <p:cNvSpPr txBox="1"/>
+            <p:nvPr/>
+          </p:nvSpPr>
+          <p:spPr>
+            <a:xfrm>
+              <a:off x="6628299" y="8331926"/>
+              <a:ext cx="1776711" cy="369332"/>
+            </a:xfrm>
+            <a:prstGeom prst="rect">
+              <a:avLst/>
+            </a:prstGeom>
+            <a:solidFill>
+              <a:schemeClr val="bg1"/>
+            </a:solidFill>
+            <a:ln>
+              <a:noFill/>
+            </a:ln>
+          </p:spPr>
+          <p:txBody>
+            <a:bodyPr wrap="none" rtlCol="0">
+              <a:spAutoFit/>
+            </a:bodyPr>
+            <a:lstStyle/>
+            <a:p>
+              <a:r>
+                <a:rPr lang="en-US" sz="1800" b="1" dirty="0">
+                  <a:latin typeface="Times New Roman" panose="02020603050405020304" pitchFamily="18" charset="0"/>
+                  <a:cs typeface="Times New Roman" panose="02020603050405020304" pitchFamily="18" charset="0"/>
+                </a:rPr>
+                <a:t>2 measurements</a:t>
+              </a:r>
+            </a:p>
+          </p:txBody>
+        </p:sp>
+        <p:sp>
+          <p:nvSpPr>
+            <p:cNvPr id="42" name="Down Arrow 41">
+              <a:extLst>
+                <a:ext uri="{FF2B5EF4-FFF2-40B4-BE49-F238E27FC236}">
+                  <a16:creationId xmlns:a16="http://schemas.microsoft.com/office/drawing/2014/main" id="{6D104C4A-BB76-EC43-BC4C-9643EB804040}"/>
+                </a:ext>
+              </a:extLst>
+            </p:cNvPr>
+            <p:cNvSpPr/>
+            <p:nvPr/>
+          </p:nvSpPr>
+          <p:spPr>
+            <a:xfrm>
+              <a:off x="7504878" y="8181532"/>
+              <a:ext cx="189969" cy="225169"/>
+            </a:xfrm>
+            <a:prstGeom prst="downArrow">
+              <a:avLst/>
+            </a:prstGeom>
+          </p:spPr>
+          <p:style>
+            <a:lnRef idx="2">
+              <a:schemeClr val="accent1">
+                <a:shade val="50000"/>
+              </a:schemeClr>
+            </a:lnRef>
+            <a:fillRef idx="1">
+              <a:schemeClr val="accent1"/>
+            </a:fillRef>
+            <a:effectRef idx="0">
+              <a:schemeClr val="accent1"/>
+            </a:effectRef>
+            <a:fontRef idx="minor">
+              <a:schemeClr val="lt1"/>
+            </a:fontRef>
+          </p:style>
+          <p:txBody>
+            <a:bodyPr rtlCol="0" anchor="ctr"/>
+            <a:lstStyle/>
+            <a:p>
+              <a:pPr algn="ctr"/>
+              <a:endParaRPr lang="en-US" sz="2722"/>
+            </a:p>
+          </p:txBody>
+        </p:sp>
+        <p:sp>
+          <p:nvSpPr>
+            <p:cNvPr id="64" name="TextBox 63">
+              <a:extLst>
+                <a:ext uri="{FF2B5EF4-FFF2-40B4-BE49-F238E27FC236}">
+                  <a16:creationId xmlns:a16="http://schemas.microsoft.com/office/drawing/2014/main" id="{29161751-1A33-AE4E-B0E9-D89C4A4AF053}"/>
+                </a:ext>
+              </a:extLst>
+            </p:cNvPr>
+            <p:cNvSpPr txBox="1"/>
+            <p:nvPr/>
+          </p:nvSpPr>
+          <p:spPr>
+            <a:xfrm>
+              <a:off x="7407905" y="8689782"/>
+              <a:ext cx="2051310" cy="461665"/>
+            </a:xfrm>
+            <a:prstGeom prst="rect">
+              <a:avLst/>
+            </a:prstGeom>
+            <a:noFill/>
+          </p:spPr>
+          <p:txBody>
+            <a:bodyPr wrap="square" rtlCol="0">
+              <a:spAutoFit/>
+            </a:bodyPr>
+            <a:lstStyle/>
+            <a:p>
+              <a:pPr algn="ctr"/>
+              <a:r>
+                <a:rPr lang="en-US" sz="1200" dirty="0">
+                  <a:latin typeface="Times New Roman" panose="02020603050405020304" pitchFamily="18" charset="0"/>
+                  <a:cs typeface="Times New Roman" panose="02020603050405020304" pitchFamily="18" charset="0"/>
+                </a:rPr>
+                <a:t>Classical </a:t>
+              </a:r>
+            </a:p>
+            <a:p>
+              <a:pPr algn="ctr"/>
+              <a:r>
+                <a:rPr lang="en-US" sz="1200" dirty="0">
+                  <a:latin typeface="Times New Roman" panose="02020603050405020304" pitchFamily="18" charset="0"/>
+                  <a:cs typeface="Times New Roman" panose="02020603050405020304" pitchFamily="18" charset="0"/>
+                </a:rPr>
+                <a:t>post-processing (§6.2)</a:t>
+              </a:r>
+            </a:p>
+          </p:txBody>
+        </p:sp>
       </p:grpSp>
-      <p:sp>
-        <p:nvSpPr>
-          <p:cNvPr id="6" name="TextBox 5">
-            <a:extLst>
-              <a:ext uri="{FF2B5EF4-FFF2-40B4-BE49-F238E27FC236}">
-                <a16:creationId xmlns:a16="http://schemas.microsoft.com/office/drawing/2014/main" id="{F6F5B79D-6087-7142-A19B-81B52F6BCD52}"/>
-              </a:ext>
-            </a:extLst>
-          </p:cNvPr>
-          <p:cNvSpPr txBox="1"/>
-          <p:nvPr/>
-        </p:nvSpPr>
-        <p:spPr>
-          <a:xfrm>
-            <a:off x="3453082" y="5261862"/>
-            <a:ext cx="1492716" cy="338554"/>
-          </a:xfrm>
-          <a:prstGeom prst="rect">
-            <a:avLst/>
-          </a:prstGeom>
-          <a:noFill/>
-        </p:spPr>
-        <p:txBody>
-          <a:bodyPr wrap="none" rtlCol="0">
-            <a:spAutoFit/>
-          </a:bodyPr>
-          <a:lstStyle/>
-          <a:p>
-            <a:r>
-              <a:rPr lang="en-US" sz="1600" dirty="0">
-                <a:latin typeface="Times New Roman" panose="02020603050405020304" pitchFamily="18" charset="0"/>
-                <a:cs typeface="Times New Roman" panose="02020603050405020304" pitchFamily="18" charset="0"/>
-              </a:rPr>
-              <a:t>14 subproblems</a:t>
-            </a:r>
-          </a:p>
-        </p:txBody>
-      </p:sp>
-      <p:sp>
-        <p:nvSpPr>
-          <p:cNvPr id="41" name="TextBox 40">
-            <a:extLst>
-              <a:ext uri="{FF2B5EF4-FFF2-40B4-BE49-F238E27FC236}">
-                <a16:creationId xmlns:a16="http://schemas.microsoft.com/office/drawing/2014/main" id="{AC3E7C8E-F437-AE4C-B1E7-3F08CE17254E}"/>
-              </a:ext>
-            </a:extLst>
-          </p:cNvPr>
-          <p:cNvSpPr txBox="1"/>
-          <p:nvPr/>
-        </p:nvSpPr>
-        <p:spPr>
-          <a:xfrm>
-            <a:off x="7039951" y="6383650"/>
-            <a:ext cx="1390124" cy="338554"/>
-          </a:xfrm>
-          <a:prstGeom prst="rect">
-            <a:avLst/>
-          </a:prstGeom>
-          <a:noFill/>
-        </p:spPr>
-        <p:txBody>
-          <a:bodyPr wrap="none" rtlCol="0">
-            <a:spAutoFit/>
-          </a:bodyPr>
-          <a:lstStyle/>
-          <a:p>
-            <a:r>
-              <a:rPr lang="en-US" sz="1600" dirty="0">
-                <a:latin typeface="Times New Roman" panose="02020603050405020304" pitchFamily="18" charset="0"/>
-                <a:cs typeface="Times New Roman" panose="02020603050405020304" pitchFamily="18" charset="0"/>
-              </a:rPr>
-              <a:t>2 subproblems</a:t>
-            </a:r>
-          </a:p>
-        </p:txBody>
-      </p:sp>
-      <p:sp>
-        <p:nvSpPr>
-          <p:cNvPr id="9" name="L-Shape 8">
-            <a:extLst>
-              <a:ext uri="{FF2B5EF4-FFF2-40B4-BE49-F238E27FC236}">
-                <a16:creationId xmlns:a16="http://schemas.microsoft.com/office/drawing/2014/main" id="{18B9BAE4-E1A2-614C-A26C-8BD4A969447C}"/>
-              </a:ext>
-            </a:extLst>
-          </p:cNvPr>
-          <p:cNvSpPr/>
-          <p:nvPr/>
-        </p:nvSpPr>
-        <p:spPr>
-          <a:xfrm rot="16200000">
-            <a:off x="3323287" y="2273947"/>
-            <a:ext cx="5375879" cy="6383025"/>
-          </a:xfrm>
-          <a:prstGeom prst="corner">
-            <a:avLst>
-              <a:gd name="adj1" fmla="val 56016"/>
-              <a:gd name="adj2" fmla="val 34493"/>
-            </a:avLst>
-          </a:prstGeom>
-          <a:noFill/>
-          <a:ln>
-            <a:solidFill>
-              <a:schemeClr val="tx1"/>
-            </a:solidFill>
-          </a:ln>
-        </p:spPr>
-        <p:style>
-          <a:lnRef idx="2">
-            <a:schemeClr val="accent1">
-              <a:shade val="50000"/>
-            </a:schemeClr>
-          </a:lnRef>
-          <a:fillRef idx="1">
-            <a:schemeClr val="accent1"/>
-          </a:fillRef>
-          <a:effectRef idx="0">
-            <a:schemeClr val="accent1"/>
-          </a:effectRef>
-          <a:fontRef idx="minor">
-            <a:schemeClr val="lt1"/>
-          </a:fontRef>
-        </p:style>
-        <p:txBody>
-          <a:bodyPr rtlCol="0" anchor="ctr"/>
-          <a:lstStyle/>
-          <a:p>
-            <a:pPr algn="ctr"/>
-            <a:endParaRPr lang="en-US"/>
-          </a:p>
-        </p:txBody>
-      </p:sp>
-      <p:sp>
-        <p:nvSpPr>
-          <p:cNvPr id="45" name="TextBox 44">
-            <a:extLst>
-              <a:ext uri="{FF2B5EF4-FFF2-40B4-BE49-F238E27FC236}">
-                <a16:creationId xmlns:a16="http://schemas.microsoft.com/office/drawing/2014/main" id="{9E773474-E024-1D49-ACAF-273612621E6D}"/>
-              </a:ext>
-            </a:extLst>
-          </p:cNvPr>
-          <p:cNvSpPr txBox="1"/>
-          <p:nvPr/>
-        </p:nvSpPr>
-        <p:spPr>
-          <a:xfrm>
-            <a:off x="6225070" y="6894685"/>
-            <a:ext cx="2975432" cy="397480"/>
-          </a:xfrm>
-          <a:prstGeom prst="rect">
-            <a:avLst/>
-          </a:prstGeom>
-          <a:noFill/>
-        </p:spPr>
-        <p:txBody>
-          <a:bodyPr wrap="square" rtlCol="0">
-            <a:spAutoFit/>
-          </a:bodyPr>
-          <a:lstStyle/>
-          <a:p>
-            <a:pPr algn="ctr"/>
-            <a:r>
-              <a:rPr lang="en-US" sz="2000" dirty="0">
-                <a:latin typeface="Times New Roman" panose="02020603050405020304" pitchFamily="18" charset="0"/>
-                <a:cs typeface="Times New Roman" panose="02020603050405020304" pitchFamily="18" charset="0"/>
-              </a:rPr>
-              <a:t>*Covariance Mitigation*</a:t>
-            </a:r>
-          </a:p>
-        </p:txBody>
-      </p:sp>
-      <p:pic>
-        <p:nvPicPr>
-          <p:cNvPr id="18" name="Picture 17">
-            <a:extLst>
-              <a:ext uri="{FF2B5EF4-FFF2-40B4-BE49-F238E27FC236}">
-                <a16:creationId xmlns:a16="http://schemas.microsoft.com/office/drawing/2014/main" id="{DE526BF7-BCB4-0643-9A26-8F75669A65B6}"/>
-              </a:ext>
-            </a:extLst>
-          </p:cNvPr>
-          <p:cNvPicPr>
-            <a:picLocks noChangeAspect="1"/>
-          </p:cNvPicPr>
-          <p:nvPr/>
-        </p:nvPicPr>
-        <p:blipFill rotWithShape="1">
-          <a:blip r:embed="rId9"/>
-          <a:srcRect t="60037"/>
-          <a:stretch/>
-        </p:blipFill>
-        <p:spPr>
-          <a:xfrm>
-            <a:off x="6108594" y="7662470"/>
-            <a:ext cx="2818109" cy="397480"/>
-          </a:xfrm>
-          <a:prstGeom prst="rect">
-            <a:avLst/>
-          </a:prstGeom>
-        </p:spPr>
-      </p:pic>
-      <p:pic>
-        <p:nvPicPr>
-          <p:cNvPr id="49" name="Picture 48">
-            <a:extLst>
-              <a:ext uri="{FF2B5EF4-FFF2-40B4-BE49-F238E27FC236}">
-                <a16:creationId xmlns:a16="http://schemas.microsoft.com/office/drawing/2014/main" id="{9A6F5781-A6D1-314E-B185-421AB9541BD4}"/>
-              </a:ext>
-            </a:extLst>
-          </p:cNvPr>
-          <p:cNvPicPr>
-            <a:picLocks noChangeAspect="1"/>
-          </p:cNvPicPr>
-          <p:nvPr/>
-        </p:nvPicPr>
-        <p:blipFill rotWithShape="1">
-          <a:blip r:embed="rId9"/>
-          <a:srcRect r="31297" b="60037"/>
-          <a:stretch/>
-        </p:blipFill>
-        <p:spPr>
-          <a:xfrm>
-            <a:off x="6832528" y="7292165"/>
-            <a:ext cx="1936124" cy="397480"/>
-          </a:xfrm>
-          <a:prstGeom prst="rect">
-            <a:avLst/>
-          </a:prstGeom>
-        </p:spPr>
-      </p:pic>
     </p:spTree>
     <p:extLst>
       <p:ext uri="{BB962C8B-B14F-4D97-AF65-F5344CB8AC3E}">
@@ -13532,7 +14319,7 @@
     </a:clrScheme>
     <a:fontScheme name="Office Theme">
       <a:majorFont>
-        <a:latin typeface="Calibri Light" panose="020F0302020204030204"/>
+        <a:latin typeface="Calibri Light"/>
         <a:ea typeface=""/>
         <a:cs typeface=""/>
         <a:font script="Jpan" typeface="游ゴシック Light"/>
@@ -13567,7 +14354,7 @@
         <a:font script="Geor" typeface="Sylfaen"/>
       </a:majorFont>
       <a:minorFont>
-        <a:latin typeface="Calibri" panose="020F0502020204030204"/>
+        <a:latin typeface="Calibri"/>
         <a:ea typeface=""/>
         <a:cs typeface=""/>
         <a:font script="Jpan" typeface="游ゴシック"/>
@@ -13793,7 +14580,7 @@
     </a:clrScheme>
     <a:fontScheme name="Office">
       <a:majorFont>
-        <a:latin typeface="Calibri Light" panose="020F0302020204030204"/>
+        <a:latin typeface="Calibri Light"/>
         <a:ea typeface=""/>
         <a:cs typeface=""/>
         <a:font script="Jpan" typeface="游ゴシック Light"/>
@@ -13845,7 +14632,7 @@
         <a:font script="Tfng" typeface="Ebrima"/>
       </a:majorFont>
       <a:minorFont>
-        <a:latin typeface="Calibri" panose="020F0502020204030204"/>
+        <a:latin typeface="Calibri"/>
         <a:ea typeface=""/>
         <a:cs typeface=""/>
         <a:font script="Jpan" typeface="游ゴシック"/>

</xml_diff>